<commit_message>
Almost done with final project presentation
</commit_message>
<xml_diff>
--- a/final_project/Analysis of Common Trend Strategies Using ML - Christian Ruiz.pptx
+++ b/final_project/Analysis of Common Trend Strategies Using ML - Christian Ruiz.pptx
@@ -5,7 +5,7 @@
     <p:sldMasterId id="2147483648" r:id="rId1"/>
   </p:sldMasterIdLst>
   <p:notesMasterIdLst>
-    <p:notesMasterId r:id="rId12"/>
+    <p:notesMasterId r:id="rId18"/>
   </p:notesMasterIdLst>
   <p:sldIdLst>
     <p:sldId id="256" r:id="rId2"/>
@@ -18,6 +18,12 @@
     <p:sldId id="264" r:id="rId9"/>
     <p:sldId id="265" r:id="rId10"/>
     <p:sldId id="266" r:id="rId11"/>
+    <p:sldId id="268" r:id="rId12"/>
+    <p:sldId id="269" r:id="rId13"/>
+    <p:sldId id="270" r:id="rId14"/>
+    <p:sldId id="271" r:id="rId15"/>
+    <p:sldId id="267" r:id="rId16"/>
+    <p:sldId id="272" r:id="rId17"/>
   </p:sldIdLst>
   <p:sldSz cx="12192000" cy="6858000"/>
   <p:notesSz cx="6858000" cy="9144000"/>
@@ -749,6 +755,26 @@
             <a:r>
               <a:rPr lang="en-US" dirty="0"/>
               <a:t>Signal Line = 9-Period EMA of MACD line</a:t>
+            </a:r>
+          </a:p>
+          <a:p>
+            <a:pPr marL="171450" lvl="0" indent="-171450">
+              <a:buFontTx/>
+              <a:buChar char="-"/>
+            </a:pPr>
+            <a:r>
+              <a:rPr lang="en-US" dirty="0"/>
+              <a:t>Relative Strength Index (RSI)</a:t>
+            </a:r>
+          </a:p>
+          <a:p>
+            <a:pPr marL="628650" lvl="1" indent="-171450">
+              <a:buFontTx/>
+              <a:buChar char="-"/>
+            </a:pPr>
+            <a:r>
+              <a:rPr lang="en-US" dirty="0"/>
+              <a:t>Measures speed and magnitude of a securities recent price change</a:t>
             </a:r>
           </a:p>
           <a:p>
@@ -4491,18 +4517,64 @@
           <a:p>
             <a:r>
               <a:rPr lang="en-US" dirty="0"/>
-              <a:t>20, 60, 120 </a:t>
-            </a:r>
-            <a:r>
-              <a:rPr lang="en-US"/>
-              <a:t>Period Normalization</a:t>
+              <a:t>20, 60, 120 Rolling Window Period Normalization</a:t>
             </a:r>
           </a:p>
           <a:p>
             <a:pPr lvl="1"/>
-            <a:endParaRPr lang="en-US" dirty="0"/>
-          </a:p>
-          <a:p>
+            <a:r>
+              <a:rPr lang="en-US" dirty="0"/>
+              <a:t>Min-Max Scaling</a:t>
+            </a:r>
+          </a:p>
+          <a:p>
+            <a:r>
+              <a:rPr lang="en-US" dirty="0"/>
+              <a:t>Reshaping Data For RNN</a:t>
+            </a:r>
+          </a:p>
+          <a:p>
+            <a:pPr lvl="1"/>
+            <a:r>
+              <a:rPr lang="en-US" dirty="0"/>
+              <a:t>20, 60, 120 period sequence length</a:t>
+            </a:r>
+          </a:p>
+          <a:p>
+            <a:pPr lvl="1"/>
+            <a:r>
+              <a:rPr lang="en-US" dirty="0"/>
+              <a:t>26 independent variables</a:t>
+            </a:r>
+          </a:p>
+          <a:p>
+            <a:pPr lvl="1"/>
+            <a:r>
+              <a:rPr lang="en-US" dirty="0"/>
+              <a:t>5 dependent variables</a:t>
+            </a:r>
+          </a:p>
+          <a:p>
+            <a:r>
+              <a:rPr lang="en-US" dirty="0"/>
+              <a:t>Label Encoding</a:t>
+            </a:r>
+          </a:p>
+          <a:p>
+            <a:pPr lvl="1"/>
+            <a:r>
+              <a:rPr lang="en-US" dirty="0"/>
+              <a:t>Long, Short, Hold</a:t>
+            </a:r>
+          </a:p>
+          <a:p>
+            <a:r>
+              <a:rPr lang="en-US" dirty="0"/>
+              <a:t>Principle Component Analysis</a:t>
+            </a:r>
+          </a:p>
+          <a:p>
+            <a:pPr lvl="1"/>
             <a:endParaRPr lang="en-US" dirty="0"/>
           </a:p>
         </p:txBody>
@@ -4511,6 +4583,723 @@
     <p:extLst>
       <p:ext uri="{BB962C8B-B14F-4D97-AF65-F5344CB8AC3E}">
         <p14:creationId xmlns:p14="http://schemas.microsoft.com/office/powerpoint/2010/main" val="83055241"/>
+      </p:ext>
+    </p:extLst>
+  </p:cSld>
+  <p:clrMapOvr>
+    <a:masterClrMapping/>
+  </p:clrMapOvr>
+</p:sld>
+</file>
+
+<file path=ppt/slides/slide11.xml><?xml version="1.0" encoding="utf-8"?>
+<p:sld xmlns:a="http://schemas.openxmlformats.org/drawingml/2006/main" xmlns:r="http://schemas.openxmlformats.org/officeDocument/2006/relationships" xmlns:p="http://schemas.openxmlformats.org/presentationml/2006/main">
+  <p:cSld>
+    <p:spTree>
+      <p:nvGrpSpPr>
+        <p:cNvPr id="1" name=""/>
+        <p:cNvGrpSpPr/>
+        <p:nvPr/>
+      </p:nvGrpSpPr>
+      <p:grpSpPr>
+        <a:xfrm>
+          <a:off x="0" y="0"/>
+          <a:ext cx="0" cy="0"/>
+          <a:chOff x="0" y="0"/>
+          <a:chExt cx="0" cy="0"/>
+        </a:xfrm>
+      </p:grpSpPr>
+      <p:sp>
+        <p:nvSpPr>
+          <p:cNvPr id="2" name="Title 1">
+            <a:extLst>
+              <a:ext uri="{FF2B5EF4-FFF2-40B4-BE49-F238E27FC236}">
+                <a16:creationId xmlns:a16="http://schemas.microsoft.com/office/drawing/2014/main" id="{1B89A5DF-45D8-F7A3-9820-E664AC5248D8}"/>
+              </a:ext>
+            </a:extLst>
+          </p:cNvPr>
+          <p:cNvSpPr>
+            <a:spLocks noGrp="1"/>
+          </p:cNvSpPr>
+          <p:nvPr>
+            <p:ph type="title"/>
+          </p:nvPr>
+        </p:nvSpPr>
+        <p:spPr/>
+        <p:txBody>
+          <a:bodyPr/>
+          <a:lstStyle/>
+          <a:p>
+            <a:r>
+              <a:rPr lang="en-US" dirty="0"/>
+              <a:t>Model Analysis</a:t>
+            </a:r>
+          </a:p>
+        </p:txBody>
+      </p:sp>
+      <p:sp>
+        <p:nvSpPr>
+          <p:cNvPr id="3" name="Content Placeholder 2">
+            <a:extLst>
+              <a:ext uri="{FF2B5EF4-FFF2-40B4-BE49-F238E27FC236}">
+                <a16:creationId xmlns:a16="http://schemas.microsoft.com/office/drawing/2014/main" id="{DD96F934-A92A-A19A-A673-68206E254C4D}"/>
+              </a:ext>
+            </a:extLst>
+          </p:cNvPr>
+          <p:cNvSpPr>
+            <a:spLocks noGrp="1"/>
+          </p:cNvSpPr>
+          <p:nvPr>
+            <p:ph idx="1"/>
+          </p:nvPr>
+        </p:nvSpPr>
+        <p:spPr/>
+        <p:txBody>
+          <a:bodyPr/>
+          <a:lstStyle/>
+          <a:p>
+            <a:pPr>
+              <a:lnSpc>
+                <a:spcPct val="150000"/>
+              </a:lnSpc>
+            </a:pPr>
+            <a:r>
+              <a:rPr lang="en-US" dirty="0"/>
+              <a:t>LSTM</a:t>
+            </a:r>
+          </a:p>
+          <a:p>
+            <a:pPr>
+              <a:lnSpc>
+                <a:spcPct val="150000"/>
+              </a:lnSpc>
+            </a:pPr>
+            <a:r>
+              <a:rPr lang="en-US" dirty="0" err="1"/>
+              <a:t>XGBClassifier</a:t>
+            </a:r>
+            <a:endParaRPr lang="en-US" dirty="0"/>
+          </a:p>
+          <a:p>
+            <a:pPr>
+              <a:lnSpc>
+                <a:spcPct val="150000"/>
+              </a:lnSpc>
+            </a:pPr>
+            <a:r>
+              <a:rPr lang="en-US" dirty="0" err="1"/>
+              <a:t>KMeans</a:t>
+            </a:r>
+            <a:endParaRPr lang="en-US" dirty="0"/>
+          </a:p>
+        </p:txBody>
+      </p:sp>
+    </p:spTree>
+    <p:extLst>
+      <p:ext uri="{BB962C8B-B14F-4D97-AF65-F5344CB8AC3E}">
+        <p14:creationId xmlns:p14="http://schemas.microsoft.com/office/powerpoint/2010/main" val="872919849"/>
+      </p:ext>
+    </p:extLst>
+  </p:cSld>
+  <p:clrMapOvr>
+    <a:masterClrMapping/>
+  </p:clrMapOvr>
+</p:sld>
+</file>
+
+<file path=ppt/slides/slide12.xml><?xml version="1.0" encoding="utf-8"?>
+<p:sld xmlns:a="http://schemas.openxmlformats.org/drawingml/2006/main" xmlns:r="http://schemas.openxmlformats.org/officeDocument/2006/relationships" xmlns:p="http://schemas.openxmlformats.org/presentationml/2006/main">
+  <p:cSld>
+    <p:spTree>
+      <p:nvGrpSpPr>
+        <p:cNvPr id="1" name=""/>
+        <p:cNvGrpSpPr/>
+        <p:nvPr/>
+      </p:nvGrpSpPr>
+      <p:grpSpPr>
+        <a:xfrm>
+          <a:off x="0" y="0"/>
+          <a:ext cx="0" cy="0"/>
+          <a:chOff x="0" y="0"/>
+          <a:chExt cx="0" cy="0"/>
+        </a:xfrm>
+      </p:grpSpPr>
+      <p:sp>
+        <p:nvSpPr>
+          <p:cNvPr id="2" name="Title 1">
+            <a:extLst>
+              <a:ext uri="{FF2B5EF4-FFF2-40B4-BE49-F238E27FC236}">
+                <a16:creationId xmlns:a16="http://schemas.microsoft.com/office/drawing/2014/main" id="{2EE054F5-4D1E-307D-CF3A-7CF34894E43A}"/>
+              </a:ext>
+            </a:extLst>
+          </p:cNvPr>
+          <p:cNvSpPr>
+            <a:spLocks noGrp="1"/>
+          </p:cNvSpPr>
+          <p:nvPr>
+            <p:ph type="title"/>
+          </p:nvPr>
+        </p:nvSpPr>
+        <p:spPr/>
+        <p:txBody>
+          <a:bodyPr/>
+          <a:lstStyle/>
+          <a:p>
+            <a:r>
+              <a:rPr lang="en-US" dirty="0"/>
+              <a:t>LSTM</a:t>
+            </a:r>
+          </a:p>
+        </p:txBody>
+      </p:sp>
+      <p:sp>
+        <p:nvSpPr>
+          <p:cNvPr id="3" name="Content Placeholder 2">
+            <a:extLst>
+              <a:ext uri="{FF2B5EF4-FFF2-40B4-BE49-F238E27FC236}">
+                <a16:creationId xmlns:a16="http://schemas.microsoft.com/office/drawing/2014/main" id="{32DB764F-5704-DFE1-1CE6-76BD58BB603D}"/>
+              </a:ext>
+            </a:extLst>
+          </p:cNvPr>
+          <p:cNvSpPr>
+            <a:spLocks noGrp="1"/>
+          </p:cNvSpPr>
+          <p:nvPr>
+            <p:ph idx="1"/>
+          </p:nvPr>
+        </p:nvSpPr>
+        <p:spPr/>
+        <p:txBody>
+          <a:bodyPr/>
+          <a:lstStyle/>
+          <a:p>
+            <a:pPr>
+              <a:lnSpc>
+                <a:spcPct val="150000"/>
+              </a:lnSpc>
+            </a:pPr>
+            <a:r>
+              <a:rPr lang="en-US" dirty="0"/>
+              <a:t>Time Series</a:t>
+            </a:r>
+          </a:p>
+          <a:p>
+            <a:pPr>
+              <a:lnSpc>
+                <a:spcPct val="150000"/>
+              </a:lnSpc>
+            </a:pPr>
+            <a:r>
+              <a:rPr lang="en-US" dirty="0"/>
+              <a:t>Multi-Output Regressor</a:t>
+            </a:r>
+          </a:p>
+          <a:p>
+            <a:pPr>
+              <a:lnSpc>
+                <a:spcPct val="150000"/>
+              </a:lnSpc>
+            </a:pPr>
+            <a:r>
+              <a:rPr lang="en-US" dirty="0"/>
+              <a:t>Available Parameter Optimization Techniques</a:t>
+            </a:r>
+          </a:p>
+        </p:txBody>
+      </p:sp>
+    </p:spTree>
+    <p:extLst>
+      <p:ext uri="{BB962C8B-B14F-4D97-AF65-F5344CB8AC3E}">
+        <p14:creationId xmlns:p14="http://schemas.microsoft.com/office/powerpoint/2010/main" val="802419690"/>
+      </p:ext>
+    </p:extLst>
+  </p:cSld>
+  <p:clrMapOvr>
+    <a:masterClrMapping/>
+  </p:clrMapOvr>
+</p:sld>
+</file>
+
+<file path=ppt/slides/slide13.xml><?xml version="1.0" encoding="utf-8"?>
+<p:sld xmlns:a="http://schemas.openxmlformats.org/drawingml/2006/main" xmlns:r="http://schemas.openxmlformats.org/officeDocument/2006/relationships" xmlns:p="http://schemas.openxmlformats.org/presentationml/2006/main">
+  <p:cSld>
+    <p:spTree>
+      <p:nvGrpSpPr>
+        <p:cNvPr id="1" name=""/>
+        <p:cNvGrpSpPr/>
+        <p:nvPr/>
+      </p:nvGrpSpPr>
+      <p:grpSpPr>
+        <a:xfrm>
+          <a:off x="0" y="0"/>
+          <a:ext cx="0" cy="0"/>
+          <a:chOff x="0" y="0"/>
+          <a:chExt cx="0" cy="0"/>
+        </a:xfrm>
+      </p:grpSpPr>
+      <p:sp>
+        <p:nvSpPr>
+          <p:cNvPr id="2" name="Title 1">
+            <a:extLst>
+              <a:ext uri="{FF2B5EF4-FFF2-40B4-BE49-F238E27FC236}">
+                <a16:creationId xmlns:a16="http://schemas.microsoft.com/office/drawing/2014/main" id="{2919525E-8D6D-1D2F-3E9F-B007362F3390}"/>
+              </a:ext>
+            </a:extLst>
+          </p:cNvPr>
+          <p:cNvSpPr>
+            <a:spLocks noGrp="1"/>
+          </p:cNvSpPr>
+          <p:nvPr>
+            <p:ph type="title"/>
+          </p:nvPr>
+        </p:nvSpPr>
+        <p:spPr/>
+        <p:txBody>
+          <a:bodyPr/>
+          <a:lstStyle/>
+          <a:p>
+            <a:r>
+              <a:rPr lang="en-US" dirty="0" err="1"/>
+              <a:t>XGBRegressor</a:t>
+            </a:r>
+            <a:endParaRPr lang="en-US" dirty="0"/>
+          </a:p>
+        </p:txBody>
+      </p:sp>
+      <p:sp>
+        <p:nvSpPr>
+          <p:cNvPr id="3" name="Content Placeholder 2">
+            <a:extLst>
+              <a:ext uri="{FF2B5EF4-FFF2-40B4-BE49-F238E27FC236}">
+                <a16:creationId xmlns:a16="http://schemas.microsoft.com/office/drawing/2014/main" id="{D1252834-5ECB-7BDC-A08D-9E6258EDA323}"/>
+              </a:ext>
+            </a:extLst>
+          </p:cNvPr>
+          <p:cNvSpPr>
+            <a:spLocks noGrp="1"/>
+          </p:cNvSpPr>
+          <p:nvPr>
+            <p:ph idx="1"/>
+          </p:nvPr>
+        </p:nvSpPr>
+        <p:spPr/>
+        <p:txBody>
+          <a:bodyPr/>
+          <a:lstStyle/>
+          <a:p>
+            <a:pPr>
+              <a:lnSpc>
+                <a:spcPct val="150000"/>
+              </a:lnSpc>
+            </a:pPr>
+            <a:r>
+              <a:rPr lang="en-US" dirty="0"/>
+              <a:t>Tree Based Model</a:t>
+            </a:r>
+          </a:p>
+          <a:p>
+            <a:pPr>
+              <a:lnSpc>
+                <a:spcPct val="150000"/>
+              </a:lnSpc>
+            </a:pPr>
+            <a:r>
+              <a:rPr lang="en-US" dirty="0"/>
+              <a:t>Robustness to Outliers</a:t>
+            </a:r>
+          </a:p>
+          <a:p>
+            <a:pPr>
+              <a:lnSpc>
+                <a:spcPct val="150000"/>
+              </a:lnSpc>
+            </a:pPr>
+            <a:r>
+              <a:rPr lang="en-US" dirty="0"/>
+              <a:t>Model Interactions Between Features</a:t>
+            </a:r>
+          </a:p>
+          <a:p>
+            <a:pPr>
+              <a:lnSpc>
+                <a:spcPct val="150000"/>
+              </a:lnSpc>
+            </a:pPr>
+            <a:r>
+              <a:rPr lang="en-US" u="sng" dirty="0"/>
+              <a:t>Does not account for Time Series Nature of Data</a:t>
+            </a:r>
+          </a:p>
+        </p:txBody>
+      </p:sp>
+    </p:spTree>
+    <p:extLst>
+      <p:ext uri="{BB962C8B-B14F-4D97-AF65-F5344CB8AC3E}">
+        <p14:creationId xmlns:p14="http://schemas.microsoft.com/office/powerpoint/2010/main" val="3705113491"/>
+      </p:ext>
+    </p:extLst>
+  </p:cSld>
+  <p:clrMapOvr>
+    <a:masterClrMapping/>
+  </p:clrMapOvr>
+</p:sld>
+</file>
+
+<file path=ppt/slides/slide14.xml><?xml version="1.0" encoding="utf-8"?>
+<p:sld xmlns:a="http://schemas.openxmlformats.org/drawingml/2006/main" xmlns:r="http://schemas.openxmlformats.org/officeDocument/2006/relationships" xmlns:p="http://schemas.openxmlformats.org/presentationml/2006/main">
+  <p:cSld>
+    <p:spTree>
+      <p:nvGrpSpPr>
+        <p:cNvPr id="1" name=""/>
+        <p:cNvGrpSpPr/>
+        <p:nvPr/>
+      </p:nvGrpSpPr>
+      <p:grpSpPr>
+        <a:xfrm>
+          <a:off x="0" y="0"/>
+          <a:ext cx="0" cy="0"/>
+          <a:chOff x="0" y="0"/>
+          <a:chExt cx="0" cy="0"/>
+        </a:xfrm>
+      </p:grpSpPr>
+      <p:sp>
+        <p:nvSpPr>
+          <p:cNvPr id="2" name="Title 1">
+            <a:extLst>
+              <a:ext uri="{FF2B5EF4-FFF2-40B4-BE49-F238E27FC236}">
+                <a16:creationId xmlns:a16="http://schemas.microsoft.com/office/drawing/2014/main" id="{7534E764-6C83-A29A-CDDA-CAAD174EBD64}"/>
+              </a:ext>
+            </a:extLst>
+          </p:cNvPr>
+          <p:cNvSpPr>
+            <a:spLocks noGrp="1"/>
+          </p:cNvSpPr>
+          <p:nvPr>
+            <p:ph type="title"/>
+          </p:nvPr>
+        </p:nvSpPr>
+        <p:spPr/>
+        <p:txBody>
+          <a:bodyPr/>
+          <a:lstStyle/>
+          <a:p>
+            <a:r>
+              <a:rPr lang="en-US" dirty="0" err="1"/>
+              <a:t>KMeans</a:t>
+            </a:r>
+            <a:endParaRPr lang="en-US" dirty="0"/>
+          </a:p>
+        </p:txBody>
+      </p:sp>
+      <p:sp>
+        <p:nvSpPr>
+          <p:cNvPr id="3" name="Content Placeholder 2">
+            <a:extLst>
+              <a:ext uri="{FF2B5EF4-FFF2-40B4-BE49-F238E27FC236}">
+                <a16:creationId xmlns:a16="http://schemas.microsoft.com/office/drawing/2014/main" id="{453C5E94-9449-0998-13D6-A3A5B9526551}"/>
+              </a:ext>
+            </a:extLst>
+          </p:cNvPr>
+          <p:cNvSpPr>
+            <a:spLocks noGrp="1"/>
+          </p:cNvSpPr>
+          <p:nvPr>
+            <p:ph idx="1"/>
+          </p:nvPr>
+        </p:nvSpPr>
+        <p:spPr/>
+        <p:txBody>
+          <a:bodyPr/>
+          <a:lstStyle/>
+          <a:p>
+            <a:pPr>
+              <a:lnSpc>
+                <a:spcPct val="150000"/>
+              </a:lnSpc>
+            </a:pPr>
+            <a:r>
+              <a:rPr lang="en-US" dirty="0"/>
+              <a:t>Not a Means of Predicting Price</a:t>
+            </a:r>
+          </a:p>
+          <a:p>
+            <a:pPr>
+              <a:lnSpc>
+                <a:spcPct val="150000"/>
+              </a:lnSpc>
+            </a:pPr>
+            <a:r>
+              <a:rPr lang="en-US" dirty="0"/>
+              <a:t>Clusters For Seasonality or Momentum</a:t>
+            </a:r>
+          </a:p>
+          <a:p>
+            <a:pPr>
+              <a:lnSpc>
+                <a:spcPct val="150000"/>
+              </a:lnSpc>
+            </a:pPr>
+            <a:r>
+              <a:rPr lang="en-US" dirty="0"/>
+              <a:t>Added Feature for Another Model</a:t>
+            </a:r>
+          </a:p>
+        </p:txBody>
+      </p:sp>
+    </p:spTree>
+    <p:extLst>
+      <p:ext uri="{BB962C8B-B14F-4D97-AF65-F5344CB8AC3E}">
+        <p14:creationId xmlns:p14="http://schemas.microsoft.com/office/powerpoint/2010/main" val="709798204"/>
+      </p:ext>
+    </p:extLst>
+  </p:cSld>
+  <p:clrMapOvr>
+    <a:masterClrMapping/>
+  </p:clrMapOvr>
+</p:sld>
+</file>
+
+<file path=ppt/slides/slide15.xml><?xml version="1.0" encoding="utf-8"?>
+<p:sld xmlns:a="http://schemas.openxmlformats.org/drawingml/2006/main" xmlns:r="http://schemas.openxmlformats.org/officeDocument/2006/relationships" xmlns:p="http://schemas.openxmlformats.org/presentationml/2006/main">
+  <p:cSld>
+    <p:spTree>
+      <p:nvGrpSpPr>
+        <p:cNvPr id="1" name=""/>
+        <p:cNvGrpSpPr/>
+        <p:nvPr/>
+      </p:nvGrpSpPr>
+      <p:grpSpPr>
+        <a:xfrm>
+          <a:off x="0" y="0"/>
+          <a:ext cx="0" cy="0"/>
+          <a:chOff x="0" y="0"/>
+          <a:chExt cx="0" cy="0"/>
+        </a:xfrm>
+      </p:grpSpPr>
+      <p:sp>
+        <p:nvSpPr>
+          <p:cNvPr id="2" name="Title 1">
+            <a:extLst>
+              <a:ext uri="{FF2B5EF4-FFF2-40B4-BE49-F238E27FC236}">
+                <a16:creationId xmlns:a16="http://schemas.microsoft.com/office/drawing/2014/main" id="{8AD089B1-CC32-6743-A42E-CCD4ED93206B}"/>
+              </a:ext>
+            </a:extLst>
+          </p:cNvPr>
+          <p:cNvSpPr>
+            <a:spLocks noGrp="1"/>
+          </p:cNvSpPr>
+          <p:nvPr>
+            <p:ph type="title"/>
+          </p:nvPr>
+        </p:nvSpPr>
+        <p:spPr>
+          <a:xfrm>
+            <a:off x="831850" y="903890"/>
+            <a:ext cx="10515600" cy="5255172"/>
+          </a:xfrm>
+        </p:spPr>
+        <p:txBody>
+          <a:bodyPr anchor="ctr">
+            <a:normAutofit fontScale="90000"/>
+          </a:bodyPr>
+          <a:lstStyle/>
+          <a:p>
+            <a:pPr>
+              <a:lnSpc>
+                <a:spcPct val="100000"/>
+              </a:lnSpc>
+            </a:pPr>
+            <a:r>
+              <a:rPr lang="en-US" dirty="0">
+                <a:solidFill>
+                  <a:schemeClr val="bg2">
+                    <a:lumMod val="90000"/>
+                  </a:schemeClr>
+                </a:solidFill>
+              </a:rPr>
+              <a:t>- Trend Strategy</a:t>
+            </a:r>
+            <a:br>
+              <a:rPr lang="en-US" dirty="0"/>
+            </a:br>
+            <a:r>
+              <a:rPr lang="en-US" dirty="0">
+                <a:solidFill>
+                  <a:schemeClr val="bg2">
+                    <a:lumMod val="90000"/>
+                  </a:schemeClr>
+                </a:solidFill>
+              </a:rPr>
+              <a:t>- Objective</a:t>
+            </a:r>
+            <a:br>
+              <a:rPr lang="en-US" dirty="0">
+                <a:solidFill>
+                  <a:schemeClr val="bg2">
+                    <a:lumMod val="90000"/>
+                  </a:schemeClr>
+                </a:solidFill>
+              </a:rPr>
+            </a:br>
+            <a:r>
+              <a:rPr lang="en-US" dirty="0">
+                <a:solidFill>
+                  <a:schemeClr val="bg2">
+                    <a:lumMod val="90000"/>
+                  </a:schemeClr>
+                </a:solidFill>
+              </a:rPr>
+              <a:t>- Data Requirements</a:t>
+            </a:r>
+            <a:br>
+              <a:rPr lang="en-US" dirty="0">
+                <a:solidFill>
+                  <a:schemeClr val="bg2">
+                    <a:lumMod val="90000"/>
+                  </a:schemeClr>
+                </a:solidFill>
+              </a:rPr>
+            </a:br>
+            <a:r>
+              <a:rPr lang="en-US" dirty="0">
+                <a:solidFill>
+                  <a:schemeClr val="bg2">
+                    <a:lumMod val="90000"/>
+                  </a:schemeClr>
+                </a:solidFill>
+              </a:rPr>
+              <a:t>- Model Analysis</a:t>
+            </a:r>
+            <a:br>
+              <a:rPr lang="en-US" dirty="0">
+                <a:solidFill>
+                  <a:schemeClr val="bg2">
+                    <a:lumMod val="90000"/>
+                  </a:schemeClr>
+                </a:solidFill>
+              </a:rPr>
+            </a:br>
+            <a:r>
+              <a:rPr lang="en-US" dirty="0"/>
+              <a:t>- Model Optimization</a:t>
+            </a:r>
+            <a:br>
+              <a:rPr lang="en-US" dirty="0">
+                <a:solidFill>
+                  <a:schemeClr val="bg2">
+                    <a:lumMod val="90000"/>
+                  </a:schemeClr>
+                </a:solidFill>
+              </a:rPr>
+            </a:br>
+            <a:r>
+              <a:rPr lang="en-US" dirty="0">
+                <a:solidFill>
+                  <a:schemeClr val="bg2">
+                    <a:lumMod val="90000"/>
+                  </a:schemeClr>
+                </a:solidFill>
+              </a:rPr>
+              <a:t>- Conclusions</a:t>
+            </a:r>
+          </a:p>
+        </p:txBody>
+      </p:sp>
+    </p:spTree>
+    <p:extLst>
+      <p:ext uri="{BB962C8B-B14F-4D97-AF65-F5344CB8AC3E}">
+        <p14:creationId xmlns:p14="http://schemas.microsoft.com/office/powerpoint/2010/main" val="101282962"/>
+      </p:ext>
+    </p:extLst>
+  </p:cSld>
+  <p:clrMapOvr>
+    <a:masterClrMapping/>
+  </p:clrMapOvr>
+</p:sld>
+</file>
+
+<file path=ppt/slides/slide16.xml><?xml version="1.0" encoding="utf-8"?>
+<p:sld xmlns:a="http://schemas.openxmlformats.org/drawingml/2006/main" xmlns:r="http://schemas.openxmlformats.org/officeDocument/2006/relationships" xmlns:p="http://schemas.openxmlformats.org/presentationml/2006/main">
+  <p:cSld>
+    <p:spTree>
+      <p:nvGrpSpPr>
+        <p:cNvPr id="1" name=""/>
+        <p:cNvGrpSpPr/>
+        <p:nvPr/>
+      </p:nvGrpSpPr>
+      <p:grpSpPr>
+        <a:xfrm>
+          <a:off x="0" y="0"/>
+          <a:ext cx="0" cy="0"/>
+          <a:chOff x="0" y="0"/>
+          <a:chExt cx="0" cy="0"/>
+        </a:xfrm>
+      </p:grpSpPr>
+      <p:sp>
+        <p:nvSpPr>
+          <p:cNvPr id="2" name="Title 1">
+            <a:extLst>
+              <a:ext uri="{FF2B5EF4-FFF2-40B4-BE49-F238E27FC236}">
+                <a16:creationId xmlns:a16="http://schemas.microsoft.com/office/drawing/2014/main" id="{285F563C-2C8A-0414-5C1D-53DAADF10354}"/>
+              </a:ext>
+            </a:extLst>
+          </p:cNvPr>
+          <p:cNvSpPr>
+            <a:spLocks noGrp="1"/>
+          </p:cNvSpPr>
+          <p:nvPr>
+            <p:ph type="title"/>
+          </p:nvPr>
+        </p:nvSpPr>
+        <p:spPr/>
+        <p:txBody>
+          <a:bodyPr/>
+          <a:lstStyle/>
+          <a:p>
+            <a:r>
+              <a:rPr lang="en-US" dirty="0"/>
+              <a:t>Model Optimization</a:t>
+            </a:r>
+          </a:p>
+        </p:txBody>
+      </p:sp>
+      <p:sp>
+        <p:nvSpPr>
+          <p:cNvPr id="3" name="Content Placeholder 2">
+            <a:extLst>
+              <a:ext uri="{FF2B5EF4-FFF2-40B4-BE49-F238E27FC236}">
+                <a16:creationId xmlns:a16="http://schemas.microsoft.com/office/drawing/2014/main" id="{3A0DF5F6-DCBD-756D-609E-92CFAF935839}"/>
+              </a:ext>
+            </a:extLst>
+          </p:cNvPr>
+          <p:cNvSpPr>
+            <a:spLocks noGrp="1"/>
+          </p:cNvSpPr>
+          <p:nvPr>
+            <p:ph idx="1"/>
+          </p:nvPr>
+        </p:nvSpPr>
+        <p:spPr/>
+        <p:txBody>
+          <a:bodyPr/>
+          <a:lstStyle/>
+          <a:p>
+            <a:r>
+              <a:rPr lang="en-US" dirty="0" err="1"/>
+              <a:t>Kmeans</a:t>
+            </a:r>
+            <a:endParaRPr lang="en-US"/>
+          </a:p>
+          <a:p>
+            <a:pPr lvl="1"/>
+            <a:endParaRPr lang="en-US"/>
+          </a:p>
+        </p:txBody>
+      </p:sp>
+    </p:spTree>
+    <p:extLst>
+      <p:ext uri="{BB962C8B-B14F-4D97-AF65-F5344CB8AC3E}">
+        <p14:creationId xmlns:p14="http://schemas.microsoft.com/office/powerpoint/2010/main" val="489459164"/>
       </p:ext>
     </p:extLst>
   </p:cSld>
@@ -5143,14 +5932,8 @@
             </a:pPr>
             <a:r>
               <a:rPr lang="en-US" dirty="0"/>
-              <a:t>based on daily market close prices of TQQQ, determine if the following 1, 3, 5, 10, or 20-day close price will yield a gain, or a loss compared to the security price at at time 0</a:t>
-            </a:r>
-          </a:p>
-          <a:p>
-            <a:pPr marL="0" indent="0" algn="ctr">
-              <a:buNone/>
-            </a:pPr>
-            <a:endParaRPr lang="en-US" dirty="0"/>
+              <a:t>Based on daily market close prices of TQQQ, determine if the following 1, 3, 5, 10, or 20-day close price will yield a gain, or a loss compared to the security price at at time 0.</a:t>
+            </a:r>
           </a:p>
         </p:txBody>
       </p:sp>

</xml_diff>

<commit_message>
Completed final project slidedeck
</commit_message>
<xml_diff>
--- a/final_project/Analysis of Common Trend Strategies Using ML - Christian Ruiz.pptx
+++ b/final_project/Analysis of Common Trend Strategies Using ML - Christian Ruiz.pptx
@@ -5,7 +5,7 @@
     <p:sldMasterId id="2147483648" r:id="rId1"/>
   </p:sldMasterIdLst>
   <p:notesMasterIdLst>
-    <p:notesMasterId r:id="rId18"/>
+    <p:notesMasterId r:id="rId23"/>
   </p:notesMasterIdLst>
   <p:sldIdLst>
     <p:sldId id="256" r:id="rId2"/>
@@ -24,6 +24,11 @@
     <p:sldId id="271" r:id="rId15"/>
     <p:sldId id="267" r:id="rId16"/>
     <p:sldId id="272" r:id="rId17"/>
+    <p:sldId id="273" r:id="rId18"/>
+    <p:sldId id="276" r:id="rId19"/>
+    <p:sldId id="274" r:id="rId20"/>
+    <p:sldId id="275" r:id="rId21"/>
+    <p:sldId id="278" r:id="rId22"/>
   </p:sldIdLst>
   <p:sldSz cx="12192000" cy="6858000"/>
   <p:notesSz cx="6858000" cy="9144000"/>
@@ -122,7 +127,323 @@
       </a:defRPr>
     </a:lvl9pPr>
   </p:defaultTextStyle>
+  <p:extLst>
+    <p:ext uri="{EFAFB233-063F-42B5-8137-9DF3F51BA10A}">
+      <p15:sldGuideLst xmlns:p15="http://schemas.microsoft.com/office/powerpoint/2012/main"/>
+    </p:ext>
+  </p:extLst>
 </p:presentation>
+</file>
+
+<file path=ppt/revisionInfo.xml><?xml version="1.0" encoding="utf-8"?>
+<p1510:revInfo xmlns:a="http://schemas.openxmlformats.org/drawingml/2006/main" xmlns:r="http://schemas.openxmlformats.org/officeDocument/2006/relationships" xmlns:p1510="http://schemas.microsoft.com/office/powerpoint/2015/10/main">
+  <p1510:revLst>
+    <p1510:client id="{B6F83378-2D8F-4D17-A5C5-31590B749CC0}" v="12" dt="2024-04-16T18:22:51.569"/>
+  </p1510:revLst>
+</p1510:revInfo>
+</file>
+
+<file path=ppt/changesInfos/changesInfo1.xml><?xml version="1.0" encoding="utf-8"?>
+<pc:chgInfo xmlns:a="http://schemas.openxmlformats.org/drawingml/2006/main" xmlns:r="http://schemas.openxmlformats.org/officeDocument/2006/relationships" xmlns:ac="http://schemas.microsoft.com/office/drawing/2013/main/command" xmlns:pc="http://schemas.microsoft.com/office/powerpoint/2013/main/command">
+  <pc:docChgLst>
+    <pc:chgData name="Christian Ruiz" userId="77721ace-9a1c-4a39-9724-72a9619b2ef1" providerId="ADAL" clId="{B6F83378-2D8F-4D17-A5C5-31590B749CC0}"/>
+    <pc:docChg chg="undo custSel addSld delSld modSld">
+      <pc:chgData name="Christian Ruiz" userId="77721ace-9a1c-4a39-9724-72a9619b2ef1" providerId="ADAL" clId="{B6F83378-2D8F-4D17-A5C5-31590B749CC0}" dt="2024-04-16T18:23:54.956" v="1114" actId="2710"/>
+      <pc:docMkLst>
+        <pc:docMk/>
+      </pc:docMkLst>
+      <pc:sldChg chg="modSp mod modNotesTx">
+        <pc:chgData name="Christian Ruiz" userId="77721ace-9a1c-4a39-9724-72a9619b2ef1" providerId="ADAL" clId="{B6F83378-2D8F-4D17-A5C5-31590B749CC0}" dt="2024-04-16T18:08:49.564" v="879" actId="20577"/>
+        <pc:sldMkLst>
+          <pc:docMk/>
+          <pc:sldMk cId="489459164" sldId="272"/>
+        </pc:sldMkLst>
+        <pc:spChg chg="mod">
+          <ac:chgData name="Christian Ruiz" userId="77721ace-9a1c-4a39-9724-72a9619b2ef1" providerId="ADAL" clId="{B6F83378-2D8F-4D17-A5C5-31590B749CC0}" dt="2024-04-16T18:08:49.564" v="879" actId="20577"/>
+          <ac:spMkLst>
+            <pc:docMk/>
+            <pc:sldMk cId="489459164" sldId="272"/>
+            <ac:spMk id="3" creationId="{3A0DF5F6-DCBD-756D-609E-92CFAF935839}"/>
+          </ac:spMkLst>
+        </pc:spChg>
+      </pc:sldChg>
+      <pc:sldChg chg="addSp delSp modSp new mod">
+        <pc:chgData name="Christian Ruiz" userId="77721ace-9a1c-4a39-9724-72a9619b2ef1" providerId="ADAL" clId="{B6F83378-2D8F-4D17-A5C5-31590B749CC0}" dt="2024-04-16T18:19:29.746" v="924" actId="1076"/>
+        <pc:sldMkLst>
+          <pc:docMk/>
+          <pc:sldMk cId="4272956498" sldId="273"/>
+        </pc:sldMkLst>
+        <pc:spChg chg="add del mod">
+          <ac:chgData name="Christian Ruiz" userId="77721ace-9a1c-4a39-9724-72a9619b2ef1" providerId="ADAL" clId="{B6F83378-2D8F-4D17-A5C5-31590B749CC0}" dt="2024-04-16T18:04:58.390" v="815" actId="478"/>
+          <ac:spMkLst>
+            <pc:docMk/>
+            <pc:sldMk cId="4272956498" sldId="273"/>
+            <ac:spMk id="2" creationId="{6A0E546C-FEE4-7D1E-1485-069AA2765C4D}"/>
+          </ac:spMkLst>
+        </pc:spChg>
+        <pc:spChg chg="del mod">
+          <ac:chgData name="Christian Ruiz" userId="77721ace-9a1c-4a39-9724-72a9619b2ef1" providerId="ADAL" clId="{B6F83378-2D8F-4D17-A5C5-31590B749CC0}" dt="2024-04-16T18:02:34.823" v="779" actId="478"/>
+          <ac:spMkLst>
+            <pc:docMk/>
+            <pc:sldMk cId="4272956498" sldId="273"/>
+            <ac:spMk id="3" creationId="{CC7381A7-B7CF-82A5-704D-F9DD178073B5}"/>
+          </ac:spMkLst>
+        </pc:spChg>
+        <pc:spChg chg="add del mod">
+          <ac:chgData name="Christian Ruiz" userId="77721ace-9a1c-4a39-9724-72a9619b2ef1" providerId="ADAL" clId="{B6F83378-2D8F-4D17-A5C5-31590B749CC0}" dt="2024-04-16T18:04:58.390" v="815" actId="478"/>
+          <ac:spMkLst>
+            <pc:docMk/>
+            <pc:sldMk cId="4272956498" sldId="273"/>
+            <ac:spMk id="7" creationId="{ED6DB1B3-277E-EB3D-613A-D88D399DEA3F}"/>
+          </ac:spMkLst>
+        </pc:spChg>
+        <pc:picChg chg="add mod">
+          <ac:chgData name="Christian Ruiz" userId="77721ace-9a1c-4a39-9724-72a9619b2ef1" providerId="ADAL" clId="{B6F83378-2D8F-4D17-A5C5-31590B749CC0}" dt="2024-04-16T18:04:57.204" v="813" actId="1076"/>
+          <ac:picMkLst>
+            <pc:docMk/>
+            <pc:sldMk cId="4272956498" sldId="273"/>
+            <ac:picMk id="5" creationId="{BBFA1396-EBB1-FC36-C30E-B0D8D5F7CEA4}"/>
+          </ac:picMkLst>
+        </pc:picChg>
+        <pc:picChg chg="add mod">
+          <ac:chgData name="Christian Ruiz" userId="77721ace-9a1c-4a39-9724-72a9619b2ef1" providerId="ADAL" clId="{B6F83378-2D8F-4D17-A5C5-31590B749CC0}" dt="2024-04-16T18:19:29.746" v="924" actId="1076"/>
+          <ac:picMkLst>
+            <pc:docMk/>
+            <pc:sldMk cId="4272956498" sldId="273"/>
+            <ac:picMk id="8" creationId="{0A5C9767-FABD-0944-DB78-9C2A13144A3B}"/>
+          </ac:picMkLst>
+        </pc:picChg>
+        <pc:picChg chg="add mod">
+          <ac:chgData name="Christian Ruiz" userId="77721ace-9a1c-4a39-9724-72a9619b2ef1" providerId="ADAL" clId="{B6F83378-2D8F-4D17-A5C5-31590B749CC0}" dt="2024-04-16T18:19:25.577" v="923" actId="1076"/>
+          <ac:picMkLst>
+            <pc:docMk/>
+            <pc:sldMk cId="4272956498" sldId="273"/>
+            <ac:picMk id="9" creationId="{77CA082F-C1F1-8162-43E6-F2CB6DED549C}"/>
+          </ac:picMkLst>
+        </pc:picChg>
+      </pc:sldChg>
+      <pc:sldChg chg="addSp delSp modSp new mod">
+        <pc:chgData name="Christian Ruiz" userId="77721ace-9a1c-4a39-9724-72a9619b2ef1" providerId="ADAL" clId="{B6F83378-2D8F-4D17-A5C5-31590B749CC0}" dt="2024-04-16T18:18:25.884" v="913" actId="1076"/>
+        <pc:sldMkLst>
+          <pc:docMk/>
+          <pc:sldMk cId="3157884044" sldId="274"/>
+        </pc:sldMkLst>
+        <pc:spChg chg="del mod">
+          <ac:chgData name="Christian Ruiz" userId="77721ace-9a1c-4a39-9724-72a9619b2ef1" providerId="ADAL" clId="{B6F83378-2D8F-4D17-A5C5-31590B749CC0}" dt="2024-04-16T18:04:28.924" v="804" actId="478"/>
+          <ac:spMkLst>
+            <pc:docMk/>
+            <pc:sldMk cId="3157884044" sldId="274"/>
+            <ac:spMk id="2" creationId="{3FB5AC57-180F-F8A0-CBD4-73B2B4C4EB7B}"/>
+          </ac:spMkLst>
+        </pc:spChg>
+        <pc:spChg chg="del mod">
+          <ac:chgData name="Christian Ruiz" userId="77721ace-9a1c-4a39-9724-72a9619b2ef1" providerId="ADAL" clId="{B6F83378-2D8F-4D17-A5C5-31590B749CC0}" dt="2024-04-16T18:03:36.368" v="798" actId="478"/>
+          <ac:spMkLst>
+            <pc:docMk/>
+            <pc:sldMk cId="3157884044" sldId="274"/>
+            <ac:spMk id="3" creationId="{B2932345-A0C5-045E-2A97-2F1D845D15AB}"/>
+          </ac:spMkLst>
+        </pc:spChg>
+        <pc:spChg chg="add del mod">
+          <ac:chgData name="Christian Ruiz" userId="77721ace-9a1c-4a39-9724-72a9619b2ef1" providerId="ADAL" clId="{B6F83378-2D8F-4D17-A5C5-31590B749CC0}" dt="2024-04-16T18:04:32.057" v="805" actId="478"/>
+          <ac:spMkLst>
+            <pc:docMk/>
+            <pc:sldMk cId="3157884044" sldId="274"/>
+            <ac:spMk id="7" creationId="{F96124E3-9FA3-D292-8D26-4B9DDE9D426E}"/>
+          </ac:spMkLst>
+        </pc:spChg>
+        <pc:picChg chg="add mod modCrop">
+          <ac:chgData name="Christian Ruiz" userId="77721ace-9a1c-4a39-9724-72a9619b2ef1" providerId="ADAL" clId="{B6F83378-2D8F-4D17-A5C5-31590B749CC0}" dt="2024-04-16T18:07:57.099" v="850" actId="1076"/>
+          <ac:picMkLst>
+            <pc:docMk/>
+            <pc:sldMk cId="3157884044" sldId="274"/>
+            <ac:picMk id="5" creationId="{592D7751-30A0-EDBB-F066-B85CD42AB10C}"/>
+          </ac:picMkLst>
+        </pc:picChg>
+        <pc:picChg chg="add del mod">
+          <ac:chgData name="Christian Ruiz" userId="77721ace-9a1c-4a39-9724-72a9619b2ef1" providerId="ADAL" clId="{B6F83378-2D8F-4D17-A5C5-31590B749CC0}" dt="2024-04-16T18:16:59.676" v="897" actId="478"/>
+          <ac:picMkLst>
+            <pc:docMk/>
+            <pc:sldMk cId="3157884044" sldId="274"/>
+            <ac:picMk id="9" creationId="{1A64CC96-2295-DD4B-BAA1-45F754F3AC0F}"/>
+          </ac:picMkLst>
+        </pc:picChg>
+        <pc:picChg chg="add">
+          <ac:chgData name="Christian Ruiz" userId="77721ace-9a1c-4a39-9724-72a9619b2ef1" providerId="ADAL" clId="{B6F83378-2D8F-4D17-A5C5-31590B749CC0}" dt="2024-04-16T18:17:20.340" v="898" actId="22"/>
+          <ac:picMkLst>
+            <pc:docMk/>
+            <pc:sldMk cId="3157884044" sldId="274"/>
+            <ac:picMk id="11" creationId="{22D17359-2DA2-E8F4-99A3-FF315F9D4526}"/>
+          </ac:picMkLst>
+        </pc:picChg>
+        <pc:picChg chg="add mod">
+          <ac:chgData name="Christian Ruiz" userId="77721ace-9a1c-4a39-9724-72a9619b2ef1" providerId="ADAL" clId="{B6F83378-2D8F-4D17-A5C5-31590B749CC0}" dt="2024-04-16T18:18:16.402" v="909" actId="1076"/>
+          <ac:picMkLst>
+            <pc:docMk/>
+            <pc:sldMk cId="3157884044" sldId="274"/>
+            <ac:picMk id="13" creationId="{E3242715-AB19-8E0E-602A-EC01EAF4105B}"/>
+          </ac:picMkLst>
+        </pc:picChg>
+        <pc:picChg chg="add mod">
+          <ac:chgData name="Christian Ruiz" userId="77721ace-9a1c-4a39-9724-72a9619b2ef1" providerId="ADAL" clId="{B6F83378-2D8F-4D17-A5C5-31590B749CC0}" dt="2024-04-16T18:17:53.516" v="903" actId="1076"/>
+          <ac:picMkLst>
+            <pc:docMk/>
+            <pc:sldMk cId="3157884044" sldId="274"/>
+            <ac:picMk id="15" creationId="{717D87B0-9A61-9C32-1ACC-F02FC7AAE311}"/>
+          </ac:picMkLst>
+        </pc:picChg>
+        <pc:picChg chg="add mod">
+          <ac:chgData name="Christian Ruiz" userId="77721ace-9a1c-4a39-9724-72a9619b2ef1" providerId="ADAL" clId="{B6F83378-2D8F-4D17-A5C5-31590B749CC0}" dt="2024-04-16T18:17:59.765" v="905" actId="1076"/>
+          <ac:picMkLst>
+            <pc:docMk/>
+            <pc:sldMk cId="3157884044" sldId="274"/>
+            <ac:picMk id="16" creationId="{8CA25158-8058-AB75-7E89-BF8F761CFAA1}"/>
+          </ac:picMkLst>
+        </pc:picChg>
+        <pc:picChg chg="add mod">
+          <ac:chgData name="Christian Ruiz" userId="77721ace-9a1c-4a39-9724-72a9619b2ef1" providerId="ADAL" clId="{B6F83378-2D8F-4D17-A5C5-31590B749CC0}" dt="2024-04-16T18:18:03.859" v="907" actId="1076"/>
+          <ac:picMkLst>
+            <pc:docMk/>
+            <pc:sldMk cId="3157884044" sldId="274"/>
+            <ac:picMk id="17" creationId="{50F45CCF-B3D4-A7FC-EC95-DC895889DED5}"/>
+          </ac:picMkLst>
+        </pc:picChg>
+        <pc:picChg chg="add mod">
+          <ac:chgData name="Christian Ruiz" userId="77721ace-9a1c-4a39-9724-72a9619b2ef1" providerId="ADAL" clId="{B6F83378-2D8F-4D17-A5C5-31590B749CC0}" dt="2024-04-16T18:18:21.567" v="911" actId="1076"/>
+          <ac:picMkLst>
+            <pc:docMk/>
+            <pc:sldMk cId="3157884044" sldId="274"/>
+            <ac:picMk id="18" creationId="{80FE886B-A831-A69C-C370-96BE4662B938}"/>
+          </ac:picMkLst>
+        </pc:picChg>
+        <pc:picChg chg="add mod">
+          <ac:chgData name="Christian Ruiz" userId="77721ace-9a1c-4a39-9724-72a9619b2ef1" providerId="ADAL" clId="{B6F83378-2D8F-4D17-A5C5-31590B749CC0}" dt="2024-04-16T18:18:25.884" v="913" actId="1076"/>
+          <ac:picMkLst>
+            <pc:docMk/>
+            <pc:sldMk cId="3157884044" sldId="274"/>
+            <ac:picMk id="19" creationId="{372E829F-EE6E-8220-7BF2-A419A0B72B7F}"/>
+          </ac:picMkLst>
+        </pc:picChg>
+      </pc:sldChg>
+      <pc:sldChg chg="modSp new mod">
+        <pc:chgData name="Christian Ruiz" userId="77721ace-9a1c-4a39-9724-72a9619b2ef1" providerId="ADAL" clId="{B6F83378-2D8F-4D17-A5C5-31590B749CC0}" dt="2024-04-16T18:23:54.956" v="1114" actId="2710"/>
+        <pc:sldMkLst>
+          <pc:docMk/>
+          <pc:sldMk cId="3609310216" sldId="275"/>
+        </pc:sldMkLst>
+        <pc:spChg chg="mod">
+          <ac:chgData name="Christian Ruiz" userId="77721ace-9a1c-4a39-9724-72a9619b2ef1" providerId="ADAL" clId="{B6F83378-2D8F-4D17-A5C5-31590B749CC0}" dt="2024-04-16T18:15:04.805" v="893" actId="20577"/>
+          <ac:spMkLst>
+            <pc:docMk/>
+            <pc:sldMk cId="3609310216" sldId="275"/>
+            <ac:spMk id="2" creationId="{D299131E-62F5-8A21-4D26-EE9E9229B703}"/>
+          </ac:spMkLst>
+        </pc:spChg>
+        <pc:spChg chg="mod">
+          <ac:chgData name="Christian Ruiz" userId="77721ace-9a1c-4a39-9724-72a9619b2ef1" providerId="ADAL" clId="{B6F83378-2D8F-4D17-A5C5-31590B749CC0}" dt="2024-04-16T18:23:54.956" v="1114" actId="2710"/>
+          <ac:spMkLst>
+            <pc:docMk/>
+            <pc:sldMk cId="3609310216" sldId="275"/>
+            <ac:spMk id="3" creationId="{0C18AD93-EF4B-689B-138F-F51D783A6BE0}"/>
+          </ac:spMkLst>
+        </pc:spChg>
+      </pc:sldChg>
+      <pc:sldChg chg="addSp delSp modSp new mod">
+        <pc:chgData name="Christian Ruiz" userId="77721ace-9a1c-4a39-9724-72a9619b2ef1" providerId="ADAL" clId="{B6F83378-2D8F-4D17-A5C5-31590B749CC0}" dt="2024-04-16T18:18:59.023" v="920" actId="1076"/>
+        <pc:sldMkLst>
+          <pc:docMk/>
+          <pc:sldMk cId="464903163" sldId="276"/>
+        </pc:sldMkLst>
+        <pc:spChg chg="mod">
+          <ac:chgData name="Christian Ruiz" userId="77721ace-9a1c-4a39-9724-72a9619b2ef1" providerId="ADAL" clId="{B6F83378-2D8F-4D17-A5C5-31590B749CC0}" dt="2024-04-16T18:06:26.956" v="838" actId="20577"/>
+          <ac:spMkLst>
+            <pc:docMk/>
+            <pc:sldMk cId="464903163" sldId="276"/>
+            <ac:spMk id="2" creationId="{BEEE5865-16E0-90B0-34CF-B84526483235}"/>
+          </ac:spMkLst>
+        </pc:spChg>
+        <pc:spChg chg="del">
+          <ac:chgData name="Christian Ruiz" userId="77721ace-9a1c-4a39-9724-72a9619b2ef1" providerId="ADAL" clId="{B6F83378-2D8F-4D17-A5C5-31590B749CC0}" dt="2024-04-16T18:06:05.570" v="823" actId="478"/>
+          <ac:spMkLst>
+            <pc:docMk/>
+            <pc:sldMk cId="464903163" sldId="276"/>
+            <ac:spMk id="3" creationId="{F88BF552-91C7-0742-B6CB-A745DCE5A831}"/>
+          </ac:spMkLst>
+        </pc:spChg>
+        <pc:picChg chg="add mod">
+          <ac:chgData name="Christian Ruiz" userId="77721ace-9a1c-4a39-9724-72a9619b2ef1" providerId="ADAL" clId="{B6F83378-2D8F-4D17-A5C5-31590B749CC0}" dt="2024-04-16T18:06:05.925" v="824"/>
+          <ac:picMkLst>
+            <pc:docMk/>
+            <pc:sldMk cId="464903163" sldId="276"/>
+            <ac:picMk id="4" creationId="{6211BDC6-0088-7F07-B613-16C0317FDB52}"/>
+          </ac:picMkLst>
+        </pc:picChg>
+        <pc:picChg chg="add mod">
+          <ac:chgData name="Christian Ruiz" userId="77721ace-9a1c-4a39-9724-72a9619b2ef1" providerId="ADAL" clId="{B6F83378-2D8F-4D17-A5C5-31590B749CC0}" dt="2024-04-16T18:18:52.598" v="918" actId="1076"/>
+          <ac:picMkLst>
+            <pc:docMk/>
+            <pc:sldMk cId="464903163" sldId="276"/>
+            <ac:picMk id="5" creationId="{9A87B375-1D23-544D-091F-D7B2F66E1E17}"/>
+          </ac:picMkLst>
+        </pc:picChg>
+        <pc:picChg chg="add mod">
+          <ac:chgData name="Christian Ruiz" userId="77721ace-9a1c-4a39-9724-72a9619b2ef1" providerId="ADAL" clId="{B6F83378-2D8F-4D17-A5C5-31590B749CC0}" dt="2024-04-16T18:18:43.719" v="915" actId="1076"/>
+          <ac:picMkLst>
+            <pc:docMk/>
+            <pc:sldMk cId="464903163" sldId="276"/>
+            <ac:picMk id="6" creationId="{D6DECD48-6E68-6237-3B61-113BAAAB3D35}"/>
+          </ac:picMkLst>
+        </pc:picChg>
+        <pc:picChg chg="add mod">
+          <ac:chgData name="Christian Ruiz" userId="77721ace-9a1c-4a39-9724-72a9619b2ef1" providerId="ADAL" clId="{B6F83378-2D8F-4D17-A5C5-31590B749CC0}" dt="2024-04-16T18:18:47.319" v="917" actId="1076"/>
+          <ac:picMkLst>
+            <pc:docMk/>
+            <pc:sldMk cId="464903163" sldId="276"/>
+            <ac:picMk id="7" creationId="{6FA44167-0A4C-ABBC-58BA-0CA441C06A5C}"/>
+          </ac:picMkLst>
+        </pc:picChg>
+        <pc:picChg chg="add mod">
+          <ac:chgData name="Christian Ruiz" userId="77721ace-9a1c-4a39-9724-72a9619b2ef1" providerId="ADAL" clId="{B6F83378-2D8F-4D17-A5C5-31590B749CC0}" dt="2024-04-16T18:18:59.023" v="920" actId="1076"/>
+          <ac:picMkLst>
+            <pc:docMk/>
+            <pc:sldMk cId="464903163" sldId="276"/>
+            <ac:picMk id="8" creationId="{47C94FE2-64B0-DF51-F64E-0A04844B6777}"/>
+          </ac:picMkLst>
+        </pc:picChg>
+      </pc:sldChg>
+      <pc:sldChg chg="add del">
+        <pc:chgData name="Christian Ruiz" userId="77721ace-9a1c-4a39-9724-72a9619b2ef1" providerId="ADAL" clId="{B6F83378-2D8F-4D17-A5C5-31590B749CC0}" dt="2024-04-16T18:23:47.324" v="1113" actId="47"/>
+        <pc:sldMkLst>
+          <pc:docMk/>
+          <pc:sldMk cId="3782564140" sldId="277"/>
+        </pc:sldMkLst>
+      </pc:sldChg>
+      <pc:sldChg chg="modSp new mod">
+        <pc:chgData name="Christian Ruiz" userId="77721ace-9a1c-4a39-9724-72a9619b2ef1" providerId="ADAL" clId="{B6F83378-2D8F-4D17-A5C5-31590B749CC0}" dt="2024-04-16T18:23:32.381" v="1112" actId="113"/>
+        <pc:sldMkLst>
+          <pc:docMk/>
+          <pc:sldMk cId="282626962" sldId="278"/>
+        </pc:sldMkLst>
+        <pc:spChg chg="mod">
+          <ac:chgData name="Christian Ruiz" userId="77721ace-9a1c-4a39-9724-72a9619b2ef1" providerId="ADAL" clId="{B6F83378-2D8F-4D17-A5C5-31590B749CC0}" dt="2024-04-16T18:23:05.153" v="1107" actId="20577"/>
+          <ac:spMkLst>
+            <pc:docMk/>
+            <pc:sldMk cId="282626962" sldId="278"/>
+            <ac:spMk id="2" creationId="{B1CA5201-17B4-CD21-016E-1F09687C3AAE}"/>
+          </ac:spMkLst>
+        </pc:spChg>
+        <pc:spChg chg="mod">
+          <ac:chgData name="Christian Ruiz" userId="77721ace-9a1c-4a39-9724-72a9619b2ef1" providerId="ADAL" clId="{B6F83378-2D8F-4D17-A5C5-31590B749CC0}" dt="2024-04-16T18:23:32.381" v="1112" actId="113"/>
+          <ac:spMkLst>
+            <pc:docMk/>
+            <pc:sldMk cId="282626962" sldId="278"/>
+            <ac:spMk id="3" creationId="{E0DED3D4-F440-72F4-2D65-DD6D59E62D3C}"/>
+          </ac:spMkLst>
+        </pc:spChg>
+      </pc:sldChg>
+    </pc:docChg>
+  </pc:docChgLst>
+</pc:chgInfo>
 </file>
 
 <file path=ppt/notesMasters/notesMaster1.xml><?xml version="1.0" encoding="utf-8"?>
@@ -207,7 +528,7 @@
           <a:p>
             <a:fld id="{E647F145-705D-B846-8C14-3608825CA8D6}" type="datetimeFigureOut">
               <a:rPr lang="en-US" smtClean="0"/>
-              <a:t>4/16/24</a:t>
+              <a:t>4/16/2024</a:t>
             </a:fld>
             <a:endParaRPr lang="en-US"/>
           </a:p>
@@ -859,6 +1180,222 @@
 </p:notes>
 </file>
 
+<file path=ppt/notesSlides/notesSlide3.xml><?xml version="1.0" encoding="utf-8"?>
+<p:notes xmlns:a="http://schemas.openxmlformats.org/drawingml/2006/main" xmlns:r="http://schemas.openxmlformats.org/officeDocument/2006/relationships" xmlns:p="http://schemas.openxmlformats.org/presentationml/2006/main">
+  <p:cSld>
+    <p:spTree>
+      <p:nvGrpSpPr>
+        <p:cNvPr id="1" name=""/>
+        <p:cNvGrpSpPr/>
+        <p:nvPr/>
+      </p:nvGrpSpPr>
+      <p:grpSpPr>
+        <a:xfrm>
+          <a:off x="0" y="0"/>
+          <a:ext cx="0" cy="0"/>
+          <a:chOff x="0" y="0"/>
+          <a:chExt cx="0" cy="0"/>
+        </a:xfrm>
+      </p:grpSpPr>
+      <p:sp>
+        <p:nvSpPr>
+          <p:cNvPr id="2" name="Slide Image Placeholder 1"/>
+          <p:cNvSpPr>
+            <a:spLocks noGrp="1" noRot="1" noChangeAspect="1"/>
+          </p:cNvSpPr>
+          <p:nvPr>
+            <p:ph type="sldImg"/>
+          </p:nvPr>
+        </p:nvSpPr>
+        <p:spPr/>
+      </p:sp>
+      <p:sp>
+        <p:nvSpPr>
+          <p:cNvPr id="3" name="Notes Placeholder 2"/>
+          <p:cNvSpPr>
+            <a:spLocks noGrp="1"/>
+          </p:cNvSpPr>
+          <p:nvPr>
+            <p:ph type="body" idx="1"/>
+          </p:nvPr>
+        </p:nvSpPr>
+        <p:spPr/>
+        <p:txBody>
+          <a:bodyPr/>
+          <a:lstStyle/>
+          <a:p>
+            <a:r>
+              <a:rPr lang="en-US" dirty="0" err="1"/>
+              <a:t>n_clusters</a:t>
+            </a:r>
+            <a:r>
+              <a:rPr lang="en-US" dirty="0"/>
+              <a:t> – number of centroid clusters</a:t>
+            </a:r>
+          </a:p>
+          <a:p>
+            <a:r>
+              <a:rPr lang="en-US" dirty="0" err="1"/>
+              <a:t>init</a:t>
+            </a:r>
+            <a:r>
+              <a:rPr lang="en-US" dirty="0"/>
+              <a:t> – initialization impacts the speed of convergence and likelihood of discovering the global optimum</a:t>
+            </a:r>
+          </a:p>
+          <a:p>
+            <a:r>
+              <a:rPr lang="en-US" dirty="0" err="1"/>
+              <a:t>n_init</a:t>
+            </a:r>
+            <a:r>
+              <a:rPr lang="en-US" dirty="0"/>
+              <a:t> – number of times the algorithm will be run with different seeds</a:t>
+            </a:r>
+          </a:p>
+          <a:p>
+            <a:endParaRPr lang="en-US" dirty="0"/>
+          </a:p>
+          <a:p>
+            <a:r>
+              <a:rPr lang="en-US" dirty="0"/>
+              <a:t>units – number of layers in the LSTM network</a:t>
+            </a:r>
+          </a:p>
+          <a:p>
+            <a:r>
+              <a:rPr lang="en-US" dirty="0"/>
+              <a:t>dropout – randomly sets % of input units to 0 at each step, prevents overfitting</a:t>
+            </a:r>
+          </a:p>
+          <a:p>
+            <a:r>
+              <a:rPr lang="en-US" dirty="0"/>
+              <a:t>optimizer – affects the rate of convergence, significantly impacts efficiency and training.</a:t>
+            </a:r>
+          </a:p>
+        </p:txBody>
+      </p:sp>
+      <p:sp>
+        <p:nvSpPr>
+          <p:cNvPr id="4" name="Slide Number Placeholder 3"/>
+          <p:cNvSpPr>
+            <a:spLocks noGrp="1"/>
+          </p:cNvSpPr>
+          <p:nvPr>
+            <p:ph type="sldNum" sz="quarter" idx="5"/>
+          </p:nvPr>
+        </p:nvSpPr>
+        <p:spPr/>
+        <p:txBody>
+          <a:bodyPr/>
+          <a:lstStyle/>
+          <a:p>
+            <a:fld id="{F4CB85D3-F5AA-DA49-B2CA-F2921E006ACB}" type="slidenum">
+              <a:rPr lang="en-US" smtClean="0"/>
+              <a:t>16</a:t>
+            </a:fld>
+            <a:endParaRPr lang="en-US"/>
+          </a:p>
+        </p:txBody>
+      </p:sp>
+    </p:spTree>
+    <p:extLst>
+      <p:ext uri="{BB962C8B-B14F-4D97-AF65-F5344CB8AC3E}">
+        <p14:creationId xmlns:p14="http://schemas.microsoft.com/office/powerpoint/2010/main" val="3654670720"/>
+      </p:ext>
+    </p:extLst>
+  </p:cSld>
+  <p:clrMapOvr>
+    <a:masterClrMapping/>
+  </p:clrMapOvr>
+</p:notes>
+</file>
+
+<file path=ppt/notesSlides/notesSlide4.xml><?xml version="1.0" encoding="utf-8"?>
+<p:notes xmlns:a="http://schemas.openxmlformats.org/drawingml/2006/main" xmlns:r="http://schemas.openxmlformats.org/officeDocument/2006/relationships" xmlns:p="http://schemas.openxmlformats.org/presentationml/2006/main">
+  <p:cSld>
+    <p:spTree>
+      <p:nvGrpSpPr>
+        <p:cNvPr id="1" name=""/>
+        <p:cNvGrpSpPr/>
+        <p:nvPr/>
+      </p:nvGrpSpPr>
+      <p:grpSpPr>
+        <a:xfrm>
+          <a:off x="0" y="0"/>
+          <a:ext cx="0" cy="0"/>
+          <a:chOff x="0" y="0"/>
+          <a:chExt cx="0" cy="0"/>
+        </a:xfrm>
+      </p:grpSpPr>
+      <p:sp>
+        <p:nvSpPr>
+          <p:cNvPr id="2" name="Slide Image Placeholder 1"/>
+          <p:cNvSpPr>
+            <a:spLocks noGrp="1" noRot="1" noChangeAspect="1"/>
+          </p:cNvSpPr>
+          <p:nvPr>
+            <p:ph type="sldImg"/>
+          </p:nvPr>
+        </p:nvSpPr>
+        <p:spPr/>
+      </p:sp>
+      <p:sp>
+        <p:nvSpPr>
+          <p:cNvPr id="3" name="Notes Placeholder 2"/>
+          <p:cNvSpPr>
+            <a:spLocks noGrp="1"/>
+          </p:cNvSpPr>
+          <p:nvPr>
+            <p:ph type="body" idx="1"/>
+          </p:nvPr>
+        </p:nvSpPr>
+        <p:spPr/>
+        <p:txBody>
+          <a:bodyPr/>
+          <a:lstStyle/>
+          <a:p>
+            <a:endParaRPr lang="en-US" dirty="0"/>
+          </a:p>
+        </p:txBody>
+      </p:sp>
+      <p:sp>
+        <p:nvSpPr>
+          <p:cNvPr id="4" name="Slide Number Placeholder 3"/>
+          <p:cNvSpPr>
+            <a:spLocks noGrp="1"/>
+          </p:cNvSpPr>
+          <p:nvPr>
+            <p:ph type="sldNum" sz="quarter" idx="5"/>
+          </p:nvPr>
+        </p:nvSpPr>
+        <p:spPr/>
+        <p:txBody>
+          <a:bodyPr/>
+          <a:lstStyle/>
+          <a:p>
+            <a:fld id="{F4CB85D3-F5AA-DA49-B2CA-F2921E006ACB}" type="slidenum">
+              <a:rPr lang="en-US" smtClean="0"/>
+              <a:t>17</a:t>
+            </a:fld>
+            <a:endParaRPr lang="en-US"/>
+          </a:p>
+        </p:txBody>
+      </p:sp>
+    </p:spTree>
+    <p:extLst>
+      <p:ext uri="{BB962C8B-B14F-4D97-AF65-F5344CB8AC3E}">
+        <p14:creationId xmlns:p14="http://schemas.microsoft.com/office/powerpoint/2010/main" val="2157745242"/>
+      </p:ext>
+    </p:extLst>
+  </p:cSld>
+  <p:clrMapOvr>
+    <a:masterClrMapping/>
+  </p:clrMapOvr>
+</p:notes>
+</file>
+
 <file path=ppt/slideLayouts/slideLayout1.xml><?xml version="1.0" encoding="utf-8"?>
 <p:sldLayout xmlns:a="http://schemas.openxmlformats.org/drawingml/2006/main" xmlns:r="http://schemas.openxmlformats.org/officeDocument/2006/relationships" xmlns:p="http://schemas.openxmlformats.org/presentationml/2006/main" type="title" preserve="1">
   <p:cSld name="Title Slide">
@@ -1008,7 +1545,7 @@
           <a:p>
             <a:fld id="{BD079BA3-418F-A34F-9EF1-20E35AB3EF26}" type="datetimeFigureOut">
               <a:rPr lang="en-US" smtClean="0"/>
-              <a:t>4/16/24</a:t>
+              <a:t>4/16/2024</a:t>
             </a:fld>
             <a:endParaRPr lang="en-US"/>
           </a:p>
@@ -1245,7 +1782,7 @@
             <a:fld id="{BD079BA3-418F-A34F-9EF1-20E35AB3EF26}" type="datetimeFigureOut">
               <a:rPr lang="en-US" smtClean="0"/>
               <a:pPr/>
-              <a:t>4/16/24</a:t>
+              <a:t>4/16/2024</a:t>
             </a:fld>
             <a:endParaRPr lang="en-US"/>
           </a:p>
@@ -1505,7 +2042,7 @@
             <a:fld id="{BD079BA3-418F-A34F-9EF1-20E35AB3EF26}" type="datetimeFigureOut">
               <a:rPr lang="en-US" smtClean="0"/>
               <a:pPr/>
-              <a:t>4/16/24</a:t>
+              <a:t>4/16/2024</a:t>
             </a:fld>
             <a:endParaRPr lang="en-US"/>
           </a:p>
@@ -1748,7 +2285,7 @@
           <a:p>
             <a:fld id="{BD079BA3-418F-A34F-9EF1-20E35AB3EF26}" type="datetimeFigureOut">
               <a:rPr lang="en-US" smtClean="0"/>
-              <a:t>4/16/24</a:t>
+              <a:t>4/16/2024</a:t>
             </a:fld>
             <a:endParaRPr lang="en-US"/>
           </a:p>
@@ -2026,7 +2563,7 @@
           <a:p>
             <a:fld id="{BD079BA3-418F-A34F-9EF1-20E35AB3EF26}" type="datetimeFigureOut">
               <a:rPr lang="en-US" smtClean="0"/>
-              <a:t>4/16/24</a:t>
+              <a:t>4/16/2024</a:t>
             </a:fld>
             <a:endParaRPr lang="en-US"/>
           </a:p>
@@ -2349,7 +2886,7 @@
           <a:p>
             <a:fld id="{BD079BA3-418F-A34F-9EF1-20E35AB3EF26}" type="datetimeFigureOut">
               <a:rPr lang="en-US" smtClean="0"/>
-              <a:t>4/16/24</a:t>
+              <a:t>4/16/2024</a:t>
             </a:fld>
             <a:endParaRPr lang="en-US"/>
           </a:p>
@@ -2823,7 +3360,7 @@
           <a:p>
             <a:fld id="{BD079BA3-418F-A34F-9EF1-20E35AB3EF26}" type="datetimeFigureOut">
               <a:rPr lang="en-US" smtClean="0"/>
-              <a:t>4/16/24</a:t>
+              <a:t>4/16/2024</a:t>
             </a:fld>
             <a:endParaRPr lang="en-US"/>
           </a:p>
@@ -2970,7 +3507,7 @@
           <a:p>
             <a:fld id="{BD079BA3-418F-A34F-9EF1-20E35AB3EF26}" type="datetimeFigureOut">
               <a:rPr lang="en-US" smtClean="0"/>
-              <a:t>4/16/24</a:t>
+              <a:t>4/16/2024</a:t>
             </a:fld>
             <a:endParaRPr lang="en-US"/>
           </a:p>
@@ -3083,7 +3620,7 @@
           <a:p>
             <a:fld id="{BD079BA3-418F-A34F-9EF1-20E35AB3EF26}" type="datetimeFigureOut">
               <a:rPr lang="en-US" smtClean="0"/>
-              <a:t>4/16/24</a:t>
+              <a:t>4/16/2024</a:t>
             </a:fld>
             <a:endParaRPr lang="en-US"/>
           </a:p>
@@ -3408,7 +3945,7 @@
           <a:p>
             <a:fld id="{BD079BA3-418F-A34F-9EF1-20E35AB3EF26}" type="datetimeFigureOut">
               <a:rPr lang="en-US" smtClean="0"/>
-              <a:t>4/16/24</a:t>
+              <a:t>4/16/2024</a:t>
             </a:fld>
             <a:endParaRPr lang="en-US"/>
           </a:p>
@@ -3702,7 +4239,7 @@
           <a:p>
             <a:fld id="{BD079BA3-418F-A34F-9EF1-20E35AB3EF26}" type="datetimeFigureOut">
               <a:rPr lang="en-US" smtClean="0"/>
-              <a:t>4/16/24</a:t>
+              <a:t>4/16/2024</a:t>
             </a:fld>
             <a:endParaRPr lang="en-US"/>
           </a:p>
@@ -3943,7 +4480,7 @@
           <a:p>
             <a:fld id="{BD079BA3-418F-A34F-9EF1-20E35AB3EF26}" type="datetimeFigureOut">
               <a:rPr lang="en-US" smtClean="0"/>
-              <a:t>4/16/24</a:t>
+              <a:t>4/16/2024</a:t>
             </a:fld>
             <a:endParaRPr lang="en-US"/>
           </a:p>
@@ -5288,11 +5825,84 @@
               <a:rPr lang="en-US" dirty="0" err="1"/>
               <a:t>Kmeans</a:t>
             </a:r>
-            <a:endParaRPr lang="en-US"/>
+            <a:endParaRPr lang="en-US" dirty="0"/>
           </a:p>
           <a:p>
             <a:pPr lvl="1"/>
-            <a:endParaRPr lang="en-US"/>
+            <a:r>
+              <a:rPr lang="en-US" dirty="0" err="1"/>
+              <a:t>optuna</a:t>
+            </a:r>
+            <a:r>
+              <a:rPr lang="en-US" dirty="0"/>
+              <a:t> module</a:t>
+            </a:r>
+          </a:p>
+          <a:p>
+            <a:pPr lvl="1"/>
+            <a:r>
+              <a:rPr lang="en-US" dirty="0" err="1"/>
+              <a:t>n_clusters</a:t>
+            </a:r>
+            <a:r>
+              <a:rPr lang="en-US" dirty="0"/>
+              <a:t>, </a:t>
+            </a:r>
+            <a:r>
+              <a:rPr lang="en-US" dirty="0" err="1"/>
+              <a:t>init</a:t>
+            </a:r>
+            <a:r>
+              <a:rPr lang="en-US" dirty="0"/>
+              <a:t>, </a:t>
+            </a:r>
+            <a:r>
+              <a:rPr lang="en-US" dirty="0" err="1"/>
+              <a:t>n_init</a:t>
+            </a:r>
+            <a:endParaRPr lang="en-US" dirty="0"/>
+          </a:p>
+          <a:p>
+            <a:pPr lvl="1"/>
+            <a:r>
+              <a:rPr lang="en-US" dirty="0"/>
+              <a:t>Silhouette = 0.45</a:t>
+            </a:r>
+          </a:p>
+          <a:p>
+            <a:r>
+              <a:rPr lang="en-US" dirty="0"/>
+              <a:t>LSTM</a:t>
+            </a:r>
+          </a:p>
+          <a:p>
+            <a:pPr lvl="1"/>
+            <a:r>
+              <a:rPr lang="en-US" dirty="0" err="1"/>
+              <a:t>keras_tuner</a:t>
+            </a:r>
+            <a:r>
+              <a:rPr lang="en-US" dirty="0"/>
+              <a:t> module</a:t>
+            </a:r>
+          </a:p>
+          <a:p>
+            <a:pPr lvl="1"/>
+            <a:r>
+              <a:rPr lang="en-US" dirty="0"/>
+              <a:t>units, dropout, optimizer</a:t>
+            </a:r>
+          </a:p>
+          <a:p>
+            <a:pPr lvl="1"/>
+            <a:r>
+              <a:rPr lang="en-US" dirty="0"/>
+              <a:t>MSE = 0.12</a:t>
+            </a:r>
+          </a:p>
+          <a:p>
+            <a:pPr lvl="1"/>
+            <a:endParaRPr lang="en-US" dirty="0"/>
           </a:p>
         </p:txBody>
       </p:sp>
@@ -5300,6 +5910,635 @@
     <p:extLst>
       <p:ext uri="{BB962C8B-B14F-4D97-AF65-F5344CB8AC3E}">
         <p14:creationId xmlns:p14="http://schemas.microsoft.com/office/powerpoint/2010/main" val="489459164"/>
+      </p:ext>
+    </p:extLst>
+  </p:cSld>
+  <p:clrMapOvr>
+    <a:masterClrMapping/>
+  </p:clrMapOvr>
+</p:sld>
+</file>
+
+<file path=ppt/slides/slide17.xml><?xml version="1.0" encoding="utf-8"?>
+<p:sld xmlns:a="http://schemas.openxmlformats.org/drawingml/2006/main" xmlns:r="http://schemas.openxmlformats.org/officeDocument/2006/relationships" xmlns:p="http://schemas.openxmlformats.org/presentationml/2006/main">
+  <p:cSld>
+    <p:spTree>
+      <p:nvGrpSpPr>
+        <p:cNvPr id="1" name=""/>
+        <p:cNvGrpSpPr/>
+        <p:nvPr/>
+      </p:nvGrpSpPr>
+      <p:grpSpPr>
+        <a:xfrm>
+          <a:off x="0" y="0"/>
+          <a:ext cx="0" cy="0"/>
+          <a:chOff x="0" y="0"/>
+          <a:chExt cx="0" cy="0"/>
+        </a:xfrm>
+      </p:grpSpPr>
+      <p:sp>
+        <p:nvSpPr>
+          <p:cNvPr id="2" name="Title 1">
+            <a:extLst>
+              <a:ext uri="{FF2B5EF4-FFF2-40B4-BE49-F238E27FC236}">
+                <a16:creationId xmlns:a16="http://schemas.microsoft.com/office/drawing/2014/main" id="{6A0E546C-FEE4-7D1E-1485-069AA2765C4D}"/>
+              </a:ext>
+            </a:extLst>
+          </p:cNvPr>
+          <p:cNvSpPr>
+            <a:spLocks noGrp="1"/>
+          </p:cNvSpPr>
+          <p:nvPr>
+            <p:ph type="title"/>
+          </p:nvPr>
+        </p:nvSpPr>
+        <p:spPr/>
+        <p:txBody>
+          <a:bodyPr/>
+          <a:lstStyle/>
+          <a:p>
+            <a:r>
+              <a:rPr lang="en-US" dirty="0"/>
+              <a:t>Results	 - </a:t>
+            </a:r>
+            <a:r>
+              <a:rPr lang="en-US" dirty="0" err="1"/>
+              <a:t>KMeans</a:t>
+            </a:r>
+            <a:endParaRPr lang="en-US" dirty="0"/>
+          </a:p>
+        </p:txBody>
+      </p:sp>
+      <p:pic>
+        <p:nvPicPr>
+          <p:cNvPr id="5" name="Picture 4">
+            <a:extLst>
+              <a:ext uri="{FF2B5EF4-FFF2-40B4-BE49-F238E27FC236}">
+                <a16:creationId xmlns:a16="http://schemas.microsoft.com/office/drawing/2014/main" id="{BBFA1396-EBB1-FC36-C30E-B0D8D5F7CEA4}"/>
+              </a:ext>
+            </a:extLst>
+          </p:cNvPr>
+          <p:cNvPicPr>
+            <a:picLocks noChangeAspect="1"/>
+          </p:cNvPicPr>
+          <p:nvPr/>
+        </p:nvPicPr>
+        <p:blipFill>
+          <a:blip r:embed="rId3"/>
+          <a:stretch>
+            <a:fillRect/>
+          </a:stretch>
+        </p:blipFill>
+        <p:spPr>
+          <a:xfrm>
+            <a:off x="300037" y="1807708"/>
+            <a:ext cx="11591925" cy="4810125"/>
+          </a:xfrm>
+          <a:prstGeom prst="rect">
+            <a:avLst/>
+          </a:prstGeom>
+        </p:spPr>
+      </p:pic>
+      <p:pic>
+        <p:nvPicPr>
+          <p:cNvPr id="8" name="Picture 7">
+            <a:extLst>
+              <a:ext uri="{FF2B5EF4-FFF2-40B4-BE49-F238E27FC236}">
+                <a16:creationId xmlns:a16="http://schemas.microsoft.com/office/drawing/2014/main" id="{0A5C9767-FABD-0944-DB78-9C2A13144A3B}"/>
+              </a:ext>
+            </a:extLst>
+          </p:cNvPr>
+          <p:cNvPicPr>
+            <a:picLocks noChangeAspect="1"/>
+          </p:cNvPicPr>
+          <p:nvPr/>
+        </p:nvPicPr>
+        <p:blipFill>
+          <a:blip r:embed="rId4"/>
+          <a:stretch>
+            <a:fillRect/>
+          </a:stretch>
+        </p:blipFill>
+        <p:spPr>
+          <a:xfrm rot="5400000">
+            <a:off x="6127983" y="6341661"/>
+            <a:ext cx="276264" cy="676369"/>
+          </a:xfrm>
+          <a:prstGeom prst="rect">
+            <a:avLst/>
+          </a:prstGeom>
+        </p:spPr>
+      </p:pic>
+      <p:pic>
+        <p:nvPicPr>
+          <p:cNvPr id="9" name="Picture 8">
+            <a:extLst>
+              <a:ext uri="{FF2B5EF4-FFF2-40B4-BE49-F238E27FC236}">
+                <a16:creationId xmlns:a16="http://schemas.microsoft.com/office/drawing/2014/main" id="{77CA082F-C1F1-8162-43E6-F2CB6DED549C}"/>
+              </a:ext>
+            </a:extLst>
+          </p:cNvPr>
+          <p:cNvPicPr>
+            <a:picLocks noChangeAspect="1"/>
+          </p:cNvPicPr>
+          <p:nvPr/>
+        </p:nvPicPr>
+        <p:blipFill>
+          <a:blip r:embed="rId5"/>
+          <a:stretch>
+            <a:fillRect/>
+          </a:stretch>
+        </p:blipFill>
+        <p:spPr>
+          <a:xfrm rot="16200000">
+            <a:off x="-266737" y="3695737"/>
+            <a:ext cx="847843" cy="314369"/>
+          </a:xfrm>
+          <a:prstGeom prst="rect">
+            <a:avLst/>
+          </a:prstGeom>
+        </p:spPr>
+      </p:pic>
+    </p:spTree>
+    <p:extLst>
+      <p:ext uri="{BB962C8B-B14F-4D97-AF65-F5344CB8AC3E}">
+        <p14:creationId xmlns:p14="http://schemas.microsoft.com/office/powerpoint/2010/main" val="4272956498"/>
+      </p:ext>
+    </p:extLst>
+  </p:cSld>
+  <p:clrMapOvr>
+    <a:masterClrMapping/>
+  </p:clrMapOvr>
+</p:sld>
+</file>
+
+<file path=ppt/slides/slide18.xml><?xml version="1.0" encoding="utf-8"?>
+<p:sld xmlns:a="http://schemas.openxmlformats.org/drawingml/2006/main" xmlns:r="http://schemas.openxmlformats.org/officeDocument/2006/relationships" xmlns:p="http://schemas.openxmlformats.org/presentationml/2006/main">
+  <p:cSld>
+    <p:spTree>
+      <p:nvGrpSpPr>
+        <p:cNvPr id="1" name=""/>
+        <p:cNvGrpSpPr/>
+        <p:nvPr/>
+      </p:nvGrpSpPr>
+      <p:grpSpPr>
+        <a:xfrm>
+          <a:off x="0" y="0"/>
+          <a:ext cx="0" cy="0"/>
+          <a:chOff x="0" y="0"/>
+          <a:chExt cx="0" cy="0"/>
+        </a:xfrm>
+      </p:grpSpPr>
+      <p:sp>
+        <p:nvSpPr>
+          <p:cNvPr id="2" name="Title 1">
+            <a:extLst>
+              <a:ext uri="{FF2B5EF4-FFF2-40B4-BE49-F238E27FC236}">
+                <a16:creationId xmlns:a16="http://schemas.microsoft.com/office/drawing/2014/main" id="{BEEE5865-16E0-90B0-34CF-B84526483235}"/>
+              </a:ext>
+            </a:extLst>
+          </p:cNvPr>
+          <p:cNvSpPr>
+            <a:spLocks noGrp="1"/>
+          </p:cNvSpPr>
+          <p:nvPr>
+            <p:ph type="title"/>
+          </p:nvPr>
+        </p:nvSpPr>
+        <p:spPr/>
+        <p:txBody>
+          <a:bodyPr/>
+          <a:lstStyle/>
+          <a:p>
+            <a:r>
+              <a:rPr lang="en-US" dirty="0"/>
+              <a:t>Results - LSTM</a:t>
+            </a:r>
+          </a:p>
+        </p:txBody>
+      </p:sp>
+      <p:pic>
+        <p:nvPicPr>
+          <p:cNvPr id="4" name="Picture 3">
+            <a:extLst>
+              <a:ext uri="{FF2B5EF4-FFF2-40B4-BE49-F238E27FC236}">
+                <a16:creationId xmlns:a16="http://schemas.microsoft.com/office/drawing/2014/main" id="{6211BDC6-0088-7F07-B613-16C0317FDB52}"/>
+              </a:ext>
+            </a:extLst>
+          </p:cNvPr>
+          <p:cNvPicPr>
+            <a:picLocks noChangeAspect="1"/>
+          </p:cNvPicPr>
+          <p:nvPr/>
+        </p:nvPicPr>
+        <p:blipFill rotWithShape="1">
+          <a:blip r:embed="rId2"/>
+          <a:srcRect b="60084"/>
+          <a:stretch/>
+        </p:blipFill>
+        <p:spPr>
+          <a:xfrm>
+            <a:off x="323737" y="1645920"/>
+            <a:ext cx="11544526" cy="4611190"/>
+          </a:xfrm>
+          <a:prstGeom prst="rect">
+            <a:avLst/>
+          </a:prstGeom>
+        </p:spPr>
+      </p:pic>
+      <p:pic>
+        <p:nvPicPr>
+          <p:cNvPr id="5" name="Picture 4">
+            <a:extLst>
+              <a:ext uri="{FF2B5EF4-FFF2-40B4-BE49-F238E27FC236}">
+                <a16:creationId xmlns:a16="http://schemas.microsoft.com/office/drawing/2014/main" id="{9A87B375-1D23-544D-091F-D7B2F66E1E17}"/>
+              </a:ext>
+            </a:extLst>
+          </p:cNvPr>
+          <p:cNvPicPr>
+            <a:picLocks noChangeAspect="1"/>
+          </p:cNvPicPr>
+          <p:nvPr/>
+        </p:nvPicPr>
+        <p:blipFill>
+          <a:blip r:embed="rId3"/>
+          <a:stretch>
+            <a:fillRect/>
+          </a:stretch>
+        </p:blipFill>
+        <p:spPr>
+          <a:xfrm rot="5400000">
+            <a:off x="6145075" y="3487895"/>
+            <a:ext cx="276264" cy="676369"/>
+          </a:xfrm>
+          <a:prstGeom prst="rect">
+            <a:avLst/>
+          </a:prstGeom>
+        </p:spPr>
+      </p:pic>
+      <p:pic>
+        <p:nvPicPr>
+          <p:cNvPr id="6" name="Picture 5">
+            <a:extLst>
+              <a:ext uri="{FF2B5EF4-FFF2-40B4-BE49-F238E27FC236}">
+                <a16:creationId xmlns:a16="http://schemas.microsoft.com/office/drawing/2014/main" id="{D6DECD48-6E68-6237-3B61-113BAAAB3D35}"/>
+              </a:ext>
+            </a:extLst>
+          </p:cNvPr>
+          <p:cNvPicPr>
+            <a:picLocks noChangeAspect="1"/>
+          </p:cNvPicPr>
+          <p:nvPr/>
+        </p:nvPicPr>
+        <p:blipFill>
+          <a:blip r:embed="rId4"/>
+          <a:stretch>
+            <a:fillRect/>
+          </a:stretch>
+        </p:blipFill>
+        <p:spPr>
+          <a:xfrm rot="16200000">
+            <a:off x="-36836" y="2518431"/>
+            <a:ext cx="847843" cy="314369"/>
+          </a:xfrm>
+          <a:prstGeom prst="rect">
+            <a:avLst/>
+          </a:prstGeom>
+        </p:spPr>
+      </p:pic>
+      <p:pic>
+        <p:nvPicPr>
+          <p:cNvPr id="7" name="Picture 6">
+            <a:extLst>
+              <a:ext uri="{FF2B5EF4-FFF2-40B4-BE49-F238E27FC236}">
+                <a16:creationId xmlns:a16="http://schemas.microsoft.com/office/drawing/2014/main" id="{6FA44167-0A4C-ABBC-58BA-0CA441C06A5C}"/>
+              </a:ext>
+            </a:extLst>
+          </p:cNvPr>
+          <p:cNvPicPr>
+            <a:picLocks noChangeAspect="1"/>
+          </p:cNvPicPr>
+          <p:nvPr/>
+        </p:nvPicPr>
+        <p:blipFill>
+          <a:blip r:embed="rId4"/>
+          <a:stretch>
+            <a:fillRect/>
+          </a:stretch>
+        </p:blipFill>
+        <p:spPr>
+          <a:xfrm rot="16200000">
+            <a:off x="-36837" y="4773096"/>
+            <a:ext cx="847843" cy="314369"/>
+          </a:xfrm>
+          <a:prstGeom prst="rect">
+            <a:avLst/>
+          </a:prstGeom>
+        </p:spPr>
+      </p:pic>
+      <p:pic>
+        <p:nvPicPr>
+          <p:cNvPr id="8" name="Picture 7">
+            <a:extLst>
+              <a:ext uri="{FF2B5EF4-FFF2-40B4-BE49-F238E27FC236}">
+                <a16:creationId xmlns:a16="http://schemas.microsoft.com/office/drawing/2014/main" id="{47C94FE2-64B0-DF51-F64E-0A04844B6777}"/>
+              </a:ext>
+            </a:extLst>
+          </p:cNvPr>
+          <p:cNvPicPr>
+            <a:picLocks noChangeAspect="1"/>
+          </p:cNvPicPr>
+          <p:nvPr/>
+        </p:nvPicPr>
+        <p:blipFill>
+          <a:blip r:embed="rId3"/>
+          <a:stretch>
+            <a:fillRect/>
+          </a:stretch>
+        </p:blipFill>
+        <p:spPr>
+          <a:xfrm rot="5400000">
+            <a:off x="6145074" y="5801244"/>
+            <a:ext cx="276264" cy="676369"/>
+          </a:xfrm>
+          <a:prstGeom prst="rect">
+            <a:avLst/>
+          </a:prstGeom>
+        </p:spPr>
+      </p:pic>
+    </p:spTree>
+    <p:extLst>
+      <p:ext uri="{BB962C8B-B14F-4D97-AF65-F5344CB8AC3E}">
+        <p14:creationId xmlns:p14="http://schemas.microsoft.com/office/powerpoint/2010/main" val="464903163"/>
+      </p:ext>
+    </p:extLst>
+  </p:cSld>
+  <p:clrMapOvr>
+    <a:masterClrMapping/>
+  </p:clrMapOvr>
+</p:sld>
+</file>
+
+<file path=ppt/slides/slide19.xml><?xml version="1.0" encoding="utf-8"?>
+<p:sld xmlns:a="http://schemas.openxmlformats.org/drawingml/2006/main" xmlns:r="http://schemas.openxmlformats.org/officeDocument/2006/relationships" xmlns:p="http://schemas.openxmlformats.org/presentationml/2006/main">
+  <p:cSld>
+    <p:spTree>
+      <p:nvGrpSpPr>
+        <p:cNvPr id="1" name=""/>
+        <p:cNvGrpSpPr/>
+        <p:nvPr/>
+      </p:nvGrpSpPr>
+      <p:grpSpPr>
+        <a:xfrm>
+          <a:off x="0" y="0"/>
+          <a:ext cx="0" cy="0"/>
+          <a:chOff x="0" y="0"/>
+          <a:chExt cx="0" cy="0"/>
+        </a:xfrm>
+      </p:grpSpPr>
+      <p:pic>
+        <p:nvPicPr>
+          <p:cNvPr id="5" name="Picture 4">
+            <a:extLst>
+              <a:ext uri="{FF2B5EF4-FFF2-40B4-BE49-F238E27FC236}">
+                <a16:creationId xmlns:a16="http://schemas.microsoft.com/office/drawing/2014/main" id="{592D7751-30A0-EDBB-F066-B85CD42AB10C}"/>
+              </a:ext>
+            </a:extLst>
+          </p:cNvPr>
+          <p:cNvPicPr>
+            <a:picLocks noChangeAspect="1"/>
+          </p:cNvPicPr>
+          <p:nvPr/>
+        </p:nvPicPr>
+        <p:blipFill rotWithShape="1">
+          <a:blip r:embed="rId2"/>
+          <a:srcRect t="39915" b="154"/>
+          <a:stretch/>
+        </p:blipFill>
+        <p:spPr>
+          <a:xfrm>
+            <a:off x="522744" y="86688"/>
+            <a:ext cx="11146511" cy="6684624"/>
+          </a:xfrm>
+          <a:prstGeom prst="rect">
+            <a:avLst/>
+          </a:prstGeom>
+        </p:spPr>
+      </p:pic>
+      <p:pic>
+        <p:nvPicPr>
+          <p:cNvPr id="11" name="Picture 10">
+            <a:extLst>
+              <a:ext uri="{FF2B5EF4-FFF2-40B4-BE49-F238E27FC236}">
+                <a16:creationId xmlns:a16="http://schemas.microsoft.com/office/drawing/2014/main" id="{22D17359-2DA2-E8F4-99A3-FF315F9D4526}"/>
+              </a:ext>
+            </a:extLst>
+          </p:cNvPr>
+          <p:cNvPicPr>
+            <a:picLocks noChangeAspect="1"/>
+          </p:cNvPicPr>
+          <p:nvPr/>
+        </p:nvPicPr>
+        <p:blipFill>
+          <a:blip r:embed="rId3"/>
+          <a:stretch>
+            <a:fillRect/>
+          </a:stretch>
+        </p:blipFill>
+        <p:spPr>
+          <a:xfrm>
+            <a:off x="5672078" y="3271815"/>
+            <a:ext cx="847843" cy="314369"/>
+          </a:xfrm>
+          <a:prstGeom prst="rect">
+            <a:avLst/>
+          </a:prstGeom>
+        </p:spPr>
+      </p:pic>
+      <p:pic>
+        <p:nvPicPr>
+          <p:cNvPr id="13" name="Picture 12">
+            <a:extLst>
+              <a:ext uri="{FF2B5EF4-FFF2-40B4-BE49-F238E27FC236}">
+                <a16:creationId xmlns:a16="http://schemas.microsoft.com/office/drawing/2014/main" id="{E3242715-AB19-8E0E-602A-EC01EAF4105B}"/>
+              </a:ext>
+            </a:extLst>
+          </p:cNvPr>
+          <p:cNvPicPr>
+            <a:picLocks noChangeAspect="1"/>
+          </p:cNvPicPr>
+          <p:nvPr/>
+        </p:nvPicPr>
+        <p:blipFill>
+          <a:blip r:embed="rId3"/>
+          <a:stretch>
+            <a:fillRect/>
+          </a:stretch>
+        </p:blipFill>
+        <p:spPr>
+          <a:xfrm rot="16200000">
+            <a:off x="98822" y="3114630"/>
+            <a:ext cx="847843" cy="314369"/>
+          </a:xfrm>
+          <a:prstGeom prst="rect">
+            <a:avLst/>
+          </a:prstGeom>
+        </p:spPr>
+      </p:pic>
+      <p:pic>
+        <p:nvPicPr>
+          <p:cNvPr id="15" name="Picture 14">
+            <a:extLst>
+              <a:ext uri="{FF2B5EF4-FFF2-40B4-BE49-F238E27FC236}">
+                <a16:creationId xmlns:a16="http://schemas.microsoft.com/office/drawing/2014/main" id="{717D87B0-9A61-9C32-1ACC-F02FC7AAE311}"/>
+              </a:ext>
+            </a:extLst>
+          </p:cNvPr>
+          <p:cNvPicPr>
+            <a:picLocks noChangeAspect="1"/>
+          </p:cNvPicPr>
+          <p:nvPr/>
+        </p:nvPicPr>
+        <p:blipFill>
+          <a:blip r:embed="rId4"/>
+          <a:stretch>
+            <a:fillRect/>
+          </a:stretch>
+        </p:blipFill>
+        <p:spPr>
+          <a:xfrm rot="5400000">
+            <a:off x="6128783" y="6294995"/>
+            <a:ext cx="276264" cy="676369"/>
+          </a:xfrm>
+          <a:prstGeom prst="rect">
+            <a:avLst/>
+          </a:prstGeom>
+        </p:spPr>
+      </p:pic>
+      <p:pic>
+        <p:nvPicPr>
+          <p:cNvPr id="16" name="Picture 15">
+            <a:extLst>
+              <a:ext uri="{FF2B5EF4-FFF2-40B4-BE49-F238E27FC236}">
+                <a16:creationId xmlns:a16="http://schemas.microsoft.com/office/drawing/2014/main" id="{8CA25158-8058-AB75-7E89-BF8F761CFAA1}"/>
+              </a:ext>
+            </a:extLst>
+          </p:cNvPr>
+          <p:cNvPicPr>
+            <a:picLocks noChangeAspect="1"/>
+          </p:cNvPicPr>
+          <p:nvPr/>
+        </p:nvPicPr>
+        <p:blipFill>
+          <a:blip r:embed="rId4"/>
+          <a:stretch>
+            <a:fillRect/>
+          </a:stretch>
+        </p:blipFill>
+        <p:spPr>
+          <a:xfrm rot="5400000">
+            <a:off x="6128783" y="4097302"/>
+            <a:ext cx="276264" cy="676369"/>
+          </a:xfrm>
+          <a:prstGeom prst="rect">
+            <a:avLst/>
+          </a:prstGeom>
+        </p:spPr>
+      </p:pic>
+      <p:pic>
+        <p:nvPicPr>
+          <p:cNvPr id="17" name="Picture 16">
+            <a:extLst>
+              <a:ext uri="{FF2B5EF4-FFF2-40B4-BE49-F238E27FC236}">
+                <a16:creationId xmlns:a16="http://schemas.microsoft.com/office/drawing/2014/main" id="{50F45CCF-B3D4-A7FC-EC95-DC895889DED5}"/>
+              </a:ext>
+            </a:extLst>
+          </p:cNvPr>
+          <p:cNvPicPr>
+            <a:picLocks noChangeAspect="1"/>
+          </p:cNvPicPr>
+          <p:nvPr/>
+        </p:nvPicPr>
+        <p:blipFill>
+          <a:blip r:embed="rId4"/>
+          <a:stretch>
+            <a:fillRect/>
+          </a:stretch>
+        </p:blipFill>
+        <p:spPr>
+          <a:xfrm rot="5400000">
+            <a:off x="6145075" y="1849978"/>
+            <a:ext cx="276264" cy="676369"/>
+          </a:xfrm>
+          <a:prstGeom prst="rect">
+            <a:avLst/>
+          </a:prstGeom>
+        </p:spPr>
+      </p:pic>
+      <p:pic>
+        <p:nvPicPr>
+          <p:cNvPr id="18" name="Picture 17">
+            <a:extLst>
+              <a:ext uri="{FF2B5EF4-FFF2-40B4-BE49-F238E27FC236}">
+                <a16:creationId xmlns:a16="http://schemas.microsoft.com/office/drawing/2014/main" id="{80FE886B-A831-A69C-C370-96BE4662B938}"/>
+              </a:ext>
+            </a:extLst>
+          </p:cNvPr>
+          <p:cNvPicPr>
+            <a:picLocks noChangeAspect="1"/>
+          </p:cNvPicPr>
+          <p:nvPr/>
+        </p:nvPicPr>
+        <p:blipFill>
+          <a:blip r:embed="rId3"/>
+          <a:stretch>
+            <a:fillRect/>
+          </a:stretch>
+        </p:blipFill>
+        <p:spPr>
+          <a:xfrm rot="16200000">
+            <a:off x="120724" y="5300929"/>
+            <a:ext cx="847843" cy="314369"/>
+          </a:xfrm>
+          <a:prstGeom prst="rect">
+            <a:avLst/>
+          </a:prstGeom>
+        </p:spPr>
+      </p:pic>
+      <p:pic>
+        <p:nvPicPr>
+          <p:cNvPr id="19" name="Picture 18">
+            <a:extLst>
+              <a:ext uri="{FF2B5EF4-FFF2-40B4-BE49-F238E27FC236}">
+                <a16:creationId xmlns:a16="http://schemas.microsoft.com/office/drawing/2014/main" id="{372E829F-EE6E-8220-7BF2-A419A0B72B7F}"/>
+              </a:ext>
+            </a:extLst>
+          </p:cNvPr>
+          <p:cNvPicPr>
+            <a:picLocks noChangeAspect="1"/>
+          </p:cNvPicPr>
+          <p:nvPr/>
+        </p:nvPicPr>
+        <p:blipFill>
+          <a:blip r:embed="rId3"/>
+          <a:stretch>
+            <a:fillRect/>
+          </a:stretch>
+        </p:blipFill>
+        <p:spPr>
+          <a:xfrm rot="16200000">
+            <a:off x="134080" y="886184"/>
+            <a:ext cx="847843" cy="314369"/>
+          </a:xfrm>
+          <a:prstGeom prst="rect">
+            <a:avLst/>
+          </a:prstGeom>
+        </p:spPr>
+      </p:pic>
+    </p:spTree>
+    <p:extLst>
+      <p:ext uri="{BB962C8B-B14F-4D97-AF65-F5344CB8AC3E}">
+        <p14:creationId xmlns:p14="http://schemas.microsoft.com/office/powerpoint/2010/main" val="3157884044"/>
       </p:ext>
     </p:extLst>
   </p:cSld>
@@ -5405,6 +6644,249 @@
     <p:extLst>
       <p:ext uri="{BB962C8B-B14F-4D97-AF65-F5344CB8AC3E}">
         <p14:creationId xmlns:p14="http://schemas.microsoft.com/office/powerpoint/2010/main" val="1668314226"/>
+      </p:ext>
+    </p:extLst>
+  </p:cSld>
+  <p:clrMapOvr>
+    <a:masterClrMapping/>
+  </p:clrMapOvr>
+</p:sld>
+</file>
+
+<file path=ppt/slides/slide20.xml><?xml version="1.0" encoding="utf-8"?>
+<p:sld xmlns:a="http://schemas.openxmlformats.org/drawingml/2006/main" xmlns:r="http://schemas.openxmlformats.org/officeDocument/2006/relationships" xmlns:p="http://schemas.openxmlformats.org/presentationml/2006/main">
+  <p:cSld>
+    <p:spTree>
+      <p:nvGrpSpPr>
+        <p:cNvPr id="1" name=""/>
+        <p:cNvGrpSpPr/>
+        <p:nvPr/>
+      </p:nvGrpSpPr>
+      <p:grpSpPr>
+        <a:xfrm>
+          <a:off x="0" y="0"/>
+          <a:ext cx="0" cy="0"/>
+          <a:chOff x="0" y="0"/>
+          <a:chExt cx="0" cy="0"/>
+        </a:xfrm>
+      </p:grpSpPr>
+      <p:sp>
+        <p:nvSpPr>
+          <p:cNvPr id="2" name="Title 1">
+            <a:extLst>
+              <a:ext uri="{FF2B5EF4-FFF2-40B4-BE49-F238E27FC236}">
+                <a16:creationId xmlns:a16="http://schemas.microsoft.com/office/drawing/2014/main" id="{D299131E-62F5-8A21-4D26-EE9E9229B703}"/>
+              </a:ext>
+            </a:extLst>
+          </p:cNvPr>
+          <p:cNvSpPr>
+            <a:spLocks noGrp="1"/>
+          </p:cNvSpPr>
+          <p:nvPr>
+            <p:ph type="title"/>
+          </p:nvPr>
+        </p:nvSpPr>
+        <p:spPr/>
+        <p:txBody>
+          <a:bodyPr/>
+          <a:lstStyle/>
+          <a:p>
+            <a:r>
+              <a:rPr lang="en-US" dirty="0"/>
+              <a:t>Conclusions</a:t>
+            </a:r>
+          </a:p>
+        </p:txBody>
+      </p:sp>
+      <p:sp>
+        <p:nvSpPr>
+          <p:cNvPr id="3" name="Content Placeholder 2">
+            <a:extLst>
+              <a:ext uri="{FF2B5EF4-FFF2-40B4-BE49-F238E27FC236}">
+                <a16:creationId xmlns:a16="http://schemas.microsoft.com/office/drawing/2014/main" id="{0C18AD93-EF4B-689B-138F-F51D783A6BE0}"/>
+              </a:ext>
+            </a:extLst>
+          </p:cNvPr>
+          <p:cNvSpPr>
+            <a:spLocks noGrp="1"/>
+          </p:cNvSpPr>
+          <p:nvPr>
+            <p:ph idx="1"/>
+          </p:nvPr>
+        </p:nvSpPr>
+        <p:spPr/>
+        <p:txBody>
+          <a:bodyPr/>
+          <a:lstStyle/>
+          <a:p>
+            <a:pPr>
+              <a:lnSpc>
+                <a:spcPct val="150000"/>
+              </a:lnSpc>
+            </a:pPr>
+            <a:r>
+              <a:rPr lang="en-US" dirty="0" err="1"/>
+              <a:t>Kmeans</a:t>
+            </a:r>
+            <a:r>
+              <a:rPr lang="en-US" dirty="0"/>
+              <a:t> Does Not Improve LSTM</a:t>
+            </a:r>
+          </a:p>
+          <a:p>
+            <a:pPr>
+              <a:lnSpc>
+                <a:spcPct val="150000"/>
+              </a:lnSpc>
+            </a:pPr>
+            <a:r>
+              <a:rPr lang="en-US" dirty="0"/>
+              <a:t>Model Momentum Classification</a:t>
+            </a:r>
+          </a:p>
+          <a:p>
+            <a:pPr>
+              <a:lnSpc>
+                <a:spcPct val="150000"/>
+              </a:lnSpc>
+            </a:pPr>
+            <a:r>
+              <a:rPr lang="en-US" dirty="0"/>
+              <a:t>Back Testing</a:t>
+            </a:r>
+          </a:p>
+        </p:txBody>
+      </p:sp>
+    </p:spTree>
+    <p:extLst>
+      <p:ext uri="{BB962C8B-B14F-4D97-AF65-F5344CB8AC3E}">
+        <p14:creationId xmlns:p14="http://schemas.microsoft.com/office/powerpoint/2010/main" val="3609310216"/>
+      </p:ext>
+    </p:extLst>
+  </p:cSld>
+  <p:clrMapOvr>
+    <a:masterClrMapping/>
+  </p:clrMapOvr>
+</p:sld>
+</file>
+
+<file path=ppt/slides/slide21.xml><?xml version="1.0" encoding="utf-8"?>
+<p:sld xmlns:a="http://schemas.openxmlformats.org/drawingml/2006/main" xmlns:r="http://schemas.openxmlformats.org/officeDocument/2006/relationships" xmlns:p="http://schemas.openxmlformats.org/presentationml/2006/main">
+  <p:cSld>
+    <p:spTree>
+      <p:nvGrpSpPr>
+        <p:cNvPr id="1" name=""/>
+        <p:cNvGrpSpPr/>
+        <p:nvPr/>
+      </p:nvGrpSpPr>
+      <p:grpSpPr>
+        <a:xfrm>
+          <a:off x="0" y="0"/>
+          <a:ext cx="0" cy="0"/>
+          <a:chOff x="0" y="0"/>
+          <a:chExt cx="0" cy="0"/>
+        </a:xfrm>
+      </p:grpSpPr>
+      <p:sp>
+        <p:nvSpPr>
+          <p:cNvPr id="2" name="Title 1">
+            <a:extLst>
+              <a:ext uri="{FF2B5EF4-FFF2-40B4-BE49-F238E27FC236}">
+                <a16:creationId xmlns:a16="http://schemas.microsoft.com/office/drawing/2014/main" id="{B1CA5201-17B4-CD21-016E-1F09687C3AAE}"/>
+              </a:ext>
+            </a:extLst>
+          </p:cNvPr>
+          <p:cNvSpPr>
+            <a:spLocks noGrp="1"/>
+          </p:cNvSpPr>
+          <p:nvPr>
+            <p:ph type="title"/>
+          </p:nvPr>
+        </p:nvSpPr>
+        <p:spPr/>
+        <p:txBody>
+          <a:bodyPr/>
+          <a:lstStyle/>
+          <a:p>
+            <a:r>
+              <a:rPr lang="en-US" dirty="0"/>
+              <a:t>Questions?</a:t>
+            </a:r>
+          </a:p>
+        </p:txBody>
+      </p:sp>
+      <p:sp>
+        <p:nvSpPr>
+          <p:cNvPr id="3" name="Content Placeholder 2">
+            <a:extLst>
+              <a:ext uri="{FF2B5EF4-FFF2-40B4-BE49-F238E27FC236}">
+                <a16:creationId xmlns:a16="http://schemas.microsoft.com/office/drawing/2014/main" id="{E0DED3D4-F440-72F4-2D65-DD6D59E62D3C}"/>
+              </a:ext>
+            </a:extLst>
+          </p:cNvPr>
+          <p:cNvSpPr>
+            <a:spLocks noGrp="1"/>
+          </p:cNvSpPr>
+          <p:nvPr>
+            <p:ph idx="1"/>
+          </p:nvPr>
+        </p:nvSpPr>
+        <p:spPr/>
+        <p:txBody>
+          <a:bodyPr>
+            <a:normAutofit/>
+          </a:bodyPr>
+          <a:lstStyle/>
+          <a:p>
+            <a:pPr marL="0" indent="0">
+              <a:buNone/>
+            </a:pPr>
+            <a:r>
+              <a:rPr lang="en-US" sz="4800" dirty="0"/>
+              <a:t>- Trend Strategy</a:t>
+            </a:r>
+            <a:br>
+              <a:rPr lang="en-US" sz="4800" dirty="0"/>
+            </a:br>
+            <a:r>
+              <a:rPr lang="en-US" sz="4800" dirty="0"/>
+              <a:t>- Objective</a:t>
+            </a:r>
+            <a:br>
+              <a:rPr lang="en-US" sz="4800" dirty="0"/>
+            </a:br>
+            <a:r>
+              <a:rPr lang="en-US" sz="4800" dirty="0"/>
+              <a:t>- Data Requirements</a:t>
+            </a:r>
+            <a:br>
+              <a:rPr lang="en-US" sz="4800" dirty="0"/>
+            </a:br>
+            <a:r>
+              <a:rPr lang="en-US" sz="4800" dirty="0"/>
+              <a:t>- Model Analysis</a:t>
+            </a:r>
+            <a:br>
+              <a:rPr lang="en-US" sz="4800" dirty="0"/>
+            </a:br>
+            <a:r>
+              <a:rPr lang="en-US" sz="4800" dirty="0"/>
+              <a:t>- Model Optimization</a:t>
+            </a:r>
+            <a:br>
+              <a:rPr lang="en-US" sz="4800" dirty="0"/>
+            </a:br>
+            <a:r>
+              <a:rPr lang="en-US" sz="4800" dirty="0"/>
+              <a:t>- Conclusions</a:t>
+            </a:r>
+          </a:p>
+        </p:txBody>
+      </p:sp>
+    </p:spTree>
+    <p:extLst>
+      <p:ext uri="{BB962C8B-B14F-4D97-AF65-F5344CB8AC3E}">
+        <p14:creationId xmlns:p14="http://schemas.microsoft.com/office/powerpoint/2010/main" val="282626962"/>
       </p:ext>
     </p:extLst>
   </p:cSld>

</xml_diff>

<commit_message>
saved final docs for course project
</commit_message>
<xml_diff>
--- a/final_project/Analysis of Common Trend Strategies Using ML - Christian Ruiz.pptx
+++ b/final_project/Analysis of Common Trend Strategies Using ML - Christian Ruiz.pptx
@@ -528,7 +528,7 @@
           <a:p>
             <a:fld id="{E647F145-705D-B846-8C14-3608825CA8D6}" type="datetimeFigureOut">
               <a:rPr lang="en-US" smtClean="0"/>
-              <a:t>4/16/2024</a:t>
+              <a:t>4/16/24</a:t>
             </a:fld>
             <a:endParaRPr lang="en-US"/>
           </a:p>
@@ -1545,7 +1545,7 @@
           <a:p>
             <a:fld id="{BD079BA3-418F-A34F-9EF1-20E35AB3EF26}" type="datetimeFigureOut">
               <a:rPr lang="en-US" smtClean="0"/>
-              <a:t>4/16/2024</a:t>
+              <a:t>4/16/24</a:t>
             </a:fld>
             <a:endParaRPr lang="en-US"/>
           </a:p>
@@ -1782,7 +1782,7 @@
             <a:fld id="{BD079BA3-418F-A34F-9EF1-20E35AB3EF26}" type="datetimeFigureOut">
               <a:rPr lang="en-US" smtClean="0"/>
               <a:pPr/>
-              <a:t>4/16/2024</a:t>
+              <a:t>4/16/24</a:t>
             </a:fld>
             <a:endParaRPr lang="en-US"/>
           </a:p>
@@ -2042,7 +2042,7 @@
             <a:fld id="{BD079BA3-418F-A34F-9EF1-20E35AB3EF26}" type="datetimeFigureOut">
               <a:rPr lang="en-US" smtClean="0"/>
               <a:pPr/>
-              <a:t>4/16/2024</a:t>
+              <a:t>4/16/24</a:t>
             </a:fld>
             <a:endParaRPr lang="en-US"/>
           </a:p>
@@ -2285,7 +2285,7 @@
           <a:p>
             <a:fld id="{BD079BA3-418F-A34F-9EF1-20E35AB3EF26}" type="datetimeFigureOut">
               <a:rPr lang="en-US" smtClean="0"/>
-              <a:t>4/16/2024</a:t>
+              <a:t>4/16/24</a:t>
             </a:fld>
             <a:endParaRPr lang="en-US"/>
           </a:p>
@@ -2563,7 +2563,7 @@
           <a:p>
             <a:fld id="{BD079BA3-418F-A34F-9EF1-20E35AB3EF26}" type="datetimeFigureOut">
               <a:rPr lang="en-US" smtClean="0"/>
-              <a:t>4/16/2024</a:t>
+              <a:t>4/16/24</a:t>
             </a:fld>
             <a:endParaRPr lang="en-US"/>
           </a:p>
@@ -2886,7 +2886,7 @@
           <a:p>
             <a:fld id="{BD079BA3-418F-A34F-9EF1-20E35AB3EF26}" type="datetimeFigureOut">
               <a:rPr lang="en-US" smtClean="0"/>
-              <a:t>4/16/2024</a:t>
+              <a:t>4/16/24</a:t>
             </a:fld>
             <a:endParaRPr lang="en-US"/>
           </a:p>
@@ -3360,7 +3360,7 @@
           <a:p>
             <a:fld id="{BD079BA3-418F-A34F-9EF1-20E35AB3EF26}" type="datetimeFigureOut">
               <a:rPr lang="en-US" smtClean="0"/>
-              <a:t>4/16/2024</a:t>
+              <a:t>4/16/24</a:t>
             </a:fld>
             <a:endParaRPr lang="en-US"/>
           </a:p>
@@ -3507,7 +3507,7 @@
           <a:p>
             <a:fld id="{BD079BA3-418F-A34F-9EF1-20E35AB3EF26}" type="datetimeFigureOut">
               <a:rPr lang="en-US" smtClean="0"/>
-              <a:t>4/16/2024</a:t>
+              <a:t>4/16/24</a:t>
             </a:fld>
             <a:endParaRPr lang="en-US"/>
           </a:p>
@@ -3620,7 +3620,7 @@
           <a:p>
             <a:fld id="{BD079BA3-418F-A34F-9EF1-20E35AB3EF26}" type="datetimeFigureOut">
               <a:rPr lang="en-US" smtClean="0"/>
-              <a:t>4/16/2024</a:t>
+              <a:t>4/16/24</a:t>
             </a:fld>
             <a:endParaRPr lang="en-US"/>
           </a:p>
@@ -3945,7 +3945,7 @@
           <a:p>
             <a:fld id="{BD079BA3-418F-A34F-9EF1-20E35AB3EF26}" type="datetimeFigureOut">
               <a:rPr lang="en-US" smtClean="0"/>
-              <a:t>4/16/2024</a:t>
+              <a:t>4/16/24</a:t>
             </a:fld>
             <a:endParaRPr lang="en-US"/>
           </a:p>
@@ -4239,7 +4239,7 @@
           <a:p>
             <a:fld id="{BD079BA3-418F-A34F-9EF1-20E35AB3EF26}" type="datetimeFigureOut">
               <a:rPr lang="en-US" smtClean="0"/>
-              <a:t>4/16/2024</a:t>
+              <a:t>4/16/24</a:t>
             </a:fld>
             <a:endParaRPr lang="en-US"/>
           </a:p>
@@ -4480,7 +4480,7 @@
           <a:p>
             <a:fld id="{BD079BA3-418F-A34F-9EF1-20E35AB3EF26}" type="datetimeFigureOut">
               <a:rPr lang="en-US" smtClean="0"/>
-              <a:t>4/16/2024</a:t>
+              <a:t>4/16/24</a:t>
             </a:fld>
             <a:endParaRPr lang="en-US"/>
           </a:p>

</xml_diff>